<commit_message>
Updated js files using JSTree to account for change to DND API in latest release of JSTree
</commit_message>
<xml_diff>
--- a/docroot/WEB-INF/init/data/gnosis/ooxml/framework-tmpl.pptx
+++ b/docroot/WEB-INF/init/data/gnosis/ooxml/framework-tmpl.pptx
@@ -7,7 +7,7 @@
   <p:sldIdLst>
     <p:sldId id="256" r:id="rId2"/>
   </p:sldIdLst>
-  <p:sldSz cx="9144000" cy="6858000" type="screen4x3"/>
+  <p:sldSz cx="12192000" cy="6858000"/>
   <p:notesSz cx="6858000" cy="9144000"/>
   <p:defaultTextStyle>
     <a:defPPr>
@@ -136,19 +136,23 @@
         </p:nvSpPr>
         <p:spPr>
           <a:xfrm>
-            <a:off x="685800" y="2130425"/>
-            <a:ext cx="7772400" cy="1470025"/>
+            <a:off x="1524000" y="1122363"/>
+            <a:ext cx="9144000" cy="2387600"/>
           </a:xfrm>
         </p:spPr>
         <p:txBody>
-          <a:bodyPr/>
-          <a:lstStyle/>
+          <a:bodyPr anchor="b"/>
+          <a:lstStyle>
+            <a:lvl1pPr algn="ctr">
+              <a:defRPr sz="6000"/>
+            </a:lvl1pPr>
+          </a:lstStyle>
           <a:p>
             <a:r>
               <a:rPr lang="en-US" smtClean="0"/>
               <a:t>Click to edit Master title style</a:t>
             </a:r>
-            <a:endParaRPr lang="en-US"/>
+            <a:endParaRPr lang="en-GB"/>
           </a:p>
         </p:txBody>
       </p:sp>
@@ -164,8 +168,8 @@
         </p:nvSpPr>
         <p:spPr>
           <a:xfrm>
-            <a:off x="1371600" y="3886200"/>
-            <a:ext cx="6400800" cy="1752600"/>
+            <a:off x="1524000" y="3602038"/>
+            <a:ext cx="9144000" cy="1655762"/>
           </a:xfrm>
         </p:spPr>
         <p:txBody>
@@ -173,93 +177,39 @@
           <a:lstStyle>
             <a:lvl1pPr marL="0" indent="0" algn="ctr">
               <a:buNone/>
-              <a:defRPr>
-                <a:solidFill>
-                  <a:schemeClr val="tx1">
-                    <a:tint val="75000"/>
-                  </a:schemeClr>
-                </a:solidFill>
-              </a:defRPr>
+              <a:defRPr sz="2400"/>
             </a:lvl1pPr>
             <a:lvl2pPr marL="457200" indent="0" algn="ctr">
               <a:buNone/>
-              <a:defRPr>
-                <a:solidFill>
-                  <a:schemeClr val="tx1">
-                    <a:tint val="75000"/>
-                  </a:schemeClr>
-                </a:solidFill>
-              </a:defRPr>
+              <a:defRPr sz="2000"/>
             </a:lvl2pPr>
             <a:lvl3pPr marL="914400" indent="0" algn="ctr">
               <a:buNone/>
-              <a:defRPr>
-                <a:solidFill>
-                  <a:schemeClr val="tx1">
-                    <a:tint val="75000"/>
-                  </a:schemeClr>
-                </a:solidFill>
-              </a:defRPr>
+              <a:defRPr sz="1800"/>
             </a:lvl3pPr>
             <a:lvl4pPr marL="1371600" indent="0" algn="ctr">
               <a:buNone/>
-              <a:defRPr>
-                <a:solidFill>
-                  <a:schemeClr val="tx1">
-                    <a:tint val="75000"/>
-                  </a:schemeClr>
-                </a:solidFill>
-              </a:defRPr>
+              <a:defRPr sz="1600"/>
             </a:lvl4pPr>
             <a:lvl5pPr marL="1828800" indent="0" algn="ctr">
               <a:buNone/>
-              <a:defRPr>
-                <a:solidFill>
-                  <a:schemeClr val="tx1">
-                    <a:tint val="75000"/>
-                  </a:schemeClr>
-                </a:solidFill>
-              </a:defRPr>
+              <a:defRPr sz="1600"/>
             </a:lvl5pPr>
             <a:lvl6pPr marL="2286000" indent="0" algn="ctr">
               <a:buNone/>
-              <a:defRPr>
-                <a:solidFill>
-                  <a:schemeClr val="tx1">
-                    <a:tint val="75000"/>
-                  </a:schemeClr>
-                </a:solidFill>
-              </a:defRPr>
+              <a:defRPr sz="1600"/>
             </a:lvl6pPr>
             <a:lvl7pPr marL="2743200" indent="0" algn="ctr">
               <a:buNone/>
-              <a:defRPr>
-                <a:solidFill>
-                  <a:schemeClr val="tx1">
-                    <a:tint val="75000"/>
-                  </a:schemeClr>
-                </a:solidFill>
-              </a:defRPr>
+              <a:defRPr sz="1600"/>
             </a:lvl7pPr>
             <a:lvl8pPr marL="3200400" indent="0" algn="ctr">
               <a:buNone/>
-              <a:defRPr>
-                <a:solidFill>
-                  <a:schemeClr val="tx1">
-                    <a:tint val="75000"/>
-                  </a:schemeClr>
-                </a:solidFill>
-              </a:defRPr>
+              <a:defRPr sz="1600"/>
             </a:lvl8pPr>
             <a:lvl9pPr marL="3657600" indent="0" algn="ctr">
               <a:buNone/>
-              <a:defRPr>
-                <a:solidFill>
-                  <a:schemeClr val="tx1">
-                    <a:tint val="75000"/>
-                  </a:schemeClr>
-                </a:solidFill>
-              </a:defRPr>
+              <a:defRPr sz="1600"/>
             </a:lvl9pPr>
           </a:lstStyle>
           <a:p>
@@ -267,7 +217,7 @@
               <a:rPr lang="en-US" smtClean="0"/>
               <a:t>Click to edit Master subtitle style</a:t>
             </a:r>
-            <a:endParaRPr lang="en-US"/>
+            <a:endParaRPr lang="en-GB"/>
           </a:p>
         </p:txBody>
       </p:sp>
@@ -281,25 +231,16 @@
             <p:ph type="dt" sz="half" idx="10"/>
           </p:nvPr>
         </p:nvSpPr>
-        <p:spPr>
-          <a:xfrm>
-            <a:off x="457200" y="6356350"/>
-            <a:ext cx="2133600" cy="365125"/>
-          </a:xfrm>
-          <a:prstGeom prst="rect">
-            <a:avLst/>
-          </a:prstGeom>
-        </p:spPr>
-        <p:txBody>
-          <a:bodyPr/>
-          <a:lstStyle/>
-          <a:p>
-            <a:fld id="{1D8BD707-D9CF-40AE-B4C6-C98DA3205C09}" type="datetimeFigureOut">
-              <a:rPr lang="en-US" smtClean="0"/>
-              <a:pPr/>
-              <a:t>10/1/2013</a:t>
+        <p:spPr/>
+        <p:txBody>
+          <a:bodyPr/>
+          <a:lstStyle/>
+          <a:p>
+            <a:fld id="{58872975-F9EA-4892-8CC1-BA199BA7DB51}" type="datetimeFigureOut">
+              <a:rPr lang="en-GB" smtClean="0"/>
+              <a:t>17/03/2015</a:t>
             </a:fld>
-            <a:endParaRPr lang="en-US"/>
+            <a:endParaRPr lang="en-GB"/>
           </a:p>
         </p:txBody>
       </p:sp>
@@ -313,20 +254,12 @@
             <p:ph type="ftr" sz="quarter" idx="11"/>
           </p:nvPr>
         </p:nvSpPr>
-        <p:spPr>
-          <a:xfrm>
-            <a:off x="3124200" y="6356350"/>
-            <a:ext cx="2895600" cy="365125"/>
-          </a:xfrm>
-          <a:prstGeom prst="rect">
-            <a:avLst/>
-          </a:prstGeom>
-        </p:spPr>
-        <p:txBody>
-          <a:bodyPr/>
-          <a:lstStyle/>
-          <a:p>
-            <a:endParaRPr lang="en-US"/>
+        <p:spPr/>
+        <p:txBody>
+          <a:bodyPr/>
+          <a:lstStyle/>
+          <a:p>
+            <a:endParaRPr lang="en-GB"/>
           </a:p>
         </p:txBody>
       </p:sp>
@@ -345,16 +278,20 @@
           <a:bodyPr/>
           <a:lstStyle/>
           <a:p>
-            <a:fld id="{B6F15528-21DE-4FAA-801E-634DDDAF4B2B}" type="slidenum">
-              <a:rPr lang="en-US" smtClean="0"/>
-              <a:pPr/>
+            <a:fld id="{9724F7C2-7A76-419E-9588-C9F0D560C6E9}" type="slidenum">
+              <a:rPr lang="en-GB" smtClean="0"/>
               <a:t>‹#›</a:t>
             </a:fld>
-            <a:endParaRPr lang="en-US"/>
+            <a:endParaRPr lang="en-GB"/>
           </a:p>
         </p:txBody>
       </p:sp>
     </p:spTree>
+    <p:extLst>
+      <p:ext uri="{BB962C8B-B14F-4D97-AF65-F5344CB8AC3E}">
+        <p14:creationId xmlns:p14="http://schemas.microsoft.com/office/powerpoint/2010/main" val="2690706507"/>
+      </p:ext>
+    </p:extLst>
   </p:cSld>
   <p:clrMapOvr>
     <a:masterClrMapping/>
@@ -398,7 +335,7 @@
               <a:rPr lang="en-US" smtClean="0"/>
               <a:t>Click to edit Master title style</a:t>
             </a:r>
-            <a:endParaRPr lang="en-US"/>
+            <a:endParaRPr lang="en-GB"/>
           </a:p>
         </p:txBody>
       </p:sp>
@@ -450,7 +387,7 @@
               <a:rPr lang="en-US" smtClean="0"/>
               <a:t>Fifth level</a:t>
             </a:r>
-            <a:endParaRPr lang="en-US"/>
+            <a:endParaRPr lang="en-GB"/>
           </a:p>
         </p:txBody>
       </p:sp>
@@ -464,25 +401,16 @@
             <p:ph type="dt" sz="half" idx="10"/>
           </p:nvPr>
         </p:nvSpPr>
-        <p:spPr>
-          <a:xfrm>
-            <a:off x="457200" y="6356350"/>
-            <a:ext cx="2133600" cy="365125"/>
-          </a:xfrm>
-          <a:prstGeom prst="rect">
-            <a:avLst/>
-          </a:prstGeom>
-        </p:spPr>
-        <p:txBody>
-          <a:bodyPr/>
-          <a:lstStyle/>
-          <a:p>
-            <a:fld id="{1D8BD707-D9CF-40AE-B4C6-C98DA3205C09}" type="datetimeFigureOut">
-              <a:rPr lang="en-US" smtClean="0"/>
-              <a:pPr/>
-              <a:t>10/1/2013</a:t>
+        <p:spPr/>
+        <p:txBody>
+          <a:bodyPr/>
+          <a:lstStyle/>
+          <a:p>
+            <a:fld id="{58872975-F9EA-4892-8CC1-BA199BA7DB51}" type="datetimeFigureOut">
+              <a:rPr lang="en-GB" smtClean="0"/>
+              <a:t>17/03/2015</a:t>
             </a:fld>
-            <a:endParaRPr lang="en-US"/>
+            <a:endParaRPr lang="en-GB"/>
           </a:p>
         </p:txBody>
       </p:sp>
@@ -496,20 +424,12 @@
             <p:ph type="ftr" sz="quarter" idx="11"/>
           </p:nvPr>
         </p:nvSpPr>
-        <p:spPr>
-          <a:xfrm>
-            <a:off x="3124200" y="6356350"/>
-            <a:ext cx="2895600" cy="365125"/>
-          </a:xfrm>
-          <a:prstGeom prst="rect">
-            <a:avLst/>
-          </a:prstGeom>
-        </p:spPr>
-        <p:txBody>
-          <a:bodyPr/>
-          <a:lstStyle/>
-          <a:p>
-            <a:endParaRPr lang="en-US"/>
+        <p:spPr/>
+        <p:txBody>
+          <a:bodyPr/>
+          <a:lstStyle/>
+          <a:p>
+            <a:endParaRPr lang="en-GB"/>
           </a:p>
         </p:txBody>
       </p:sp>
@@ -528,16 +448,20 @@
           <a:bodyPr/>
           <a:lstStyle/>
           <a:p>
-            <a:fld id="{B6F15528-21DE-4FAA-801E-634DDDAF4B2B}" type="slidenum">
-              <a:rPr lang="en-US" smtClean="0"/>
-              <a:pPr/>
+            <a:fld id="{9724F7C2-7A76-419E-9588-C9F0D560C6E9}" type="slidenum">
+              <a:rPr lang="en-GB" smtClean="0"/>
               <a:t>‹#›</a:t>
             </a:fld>
-            <a:endParaRPr lang="en-US"/>
+            <a:endParaRPr lang="en-GB"/>
           </a:p>
         </p:txBody>
       </p:sp>
     </p:spTree>
+    <p:extLst>
+      <p:ext uri="{BB962C8B-B14F-4D97-AF65-F5344CB8AC3E}">
+        <p14:creationId xmlns:p14="http://schemas.microsoft.com/office/powerpoint/2010/main" val="3793088338"/>
+      </p:ext>
+    </p:extLst>
   </p:cSld>
   <p:clrMapOvr>
     <a:masterClrMapping/>
@@ -574,8 +498,8 @@
         </p:nvSpPr>
         <p:spPr>
           <a:xfrm>
-            <a:off x="6629400" y="274638"/>
-            <a:ext cx="2057400" cy="5851525"/>
+            <a:off x="8724900" y="365125"/>
+            <a:ext cx="2628900" cy="5811838"/>
           </a:xfrm>
         </p:spPr>
         <p:txBody>
@@ -586,7 +510,7 @@
               <a:rPr lang="en-US" smtClean="0"/>
               <a:t>Click to edit Master title style</a:t>
             </a:r>
-            <a:endParaRPr lang="en-US"/>
+            <a:endParaRPr lang="en-GB"/>
           </a:p>
         </p:txBody>
       </p:sp>
@@ -602,8 +526,8 @@
         </p:nvSpPr>
         <p:spPr>
           <a:xfrm>
-            <a:off x="457200" y="274638"/>
-            <a:ext cx="6019800" cy="5851525"/>
+            <a:off x="838200" y="365125"/>
+            <a:ext cx="7734300" cy="5811838"/>
           </a:xfrm>
         </p:spPr>
         <p:txBody>
@@ -643,7 +567,7 @@
               <a:rPr lang="en-US" smtClean="0"/>
               <a:t>Fifth level</a:t>
             </a:r>
-            <a:endParaRPr lang="en-US"/>
+            <a:endParaRPr lang="en-GB"/>
           </a:p>
         </p:txBody>
       </p:sp>
@@ -657,25 +581,16 @@
             <p:ph type="dt" sz="half" idx="10"/>
           </p:nvPr>
         </p:nvSpPr>
-        <p:spPr>
-          <a:xfrm>
-            <a:off x="457200" y="6356350"/>
-            <a:ext cx="2133600" cy="365125"/>
-          </a:xfrm>
-          <a:prstGeom prst="rect">
-            <a:avLst/>
-          </a:prstGeom>
-        </p:spPr>
-        <p:txBody>
-          <a:bodyPr/>
-          <a:lstStyle/>
-          <a:p>
-            <a:fld id="{1D8BD707-D9CF-40AE-B4C6-C98DA3205C09}" type="datetimeFigureOut">
-              <a:rPr lang="en-US" smtClean="0"/>
-              <a:pPr/>
-              <a:t>10/1/2013</a:t>
+        <p:spPr/>
+        <p:txBody>
+          <a:bodyPr/>
+          <a:lstStyle/>
+          <a:p>
+            <a:fld id="{58872975-F9EA-4892-8CC1-BA199BA7DB51}" type="datetimeFigureOut">
+              <a:rPr lang="en-GB" smtClean="0"/>
+              <a:t>17/03/2015</a:t>
             </a:fld>
-            <a:endParaRPr lang="en-US"/>
+            <a:endParaRPr lang="en-GB"/>
           </a:p>
         </p:txBody>
       </p:sp>
@@ -689,20 +604,12 @@
             <p:ph type="ftr" sz="quarter" idx="11"/>
           </p:nvPr>
         </p:nvSpPr>
-        <p:spPr>
-          <a:xfrm>
-            <a:off x="3124200" y="6356350"/>
-            <a:ext cx="2895600" cy="365125"/>
-          </a:xfrm>
-          <a:prstGeom prst="rect">
-            <a:avLst/>
-          </a:prstGeom>
-        </p:spPr>
-        <p:txBody>
-          <a:bodyPr/>
-          <a:lstStyle/>
-          <a:p>
-            <a:endParaRPr lang="en-US"/>
+        <p:spPr/>
+        <p:txBody>
+          <a:bodyPr/>
+          <a:lstStyle/>
+          <a:p>
+            <a:endParaRPr lang="en-GB"/>
           </a:p>
         </p:txBody>
       </p:sp>
@@ -721,16 +628,20 @@
           <a:bodyPr/>
           <a:lstStyle/>
           <a:p>
-            <a:fld id="{B6F15528-21DE-4FAA-801E-634DDDAF4B2B}" type="slidenum">
-              <a:rPr lang="en-US" smtClean="0"/>
-              <a:pPr/>
+            <a:fld id="{9724F7C2-7A76-419E-9588-C9F0D560C6E9}" type="slidenum">
+              <a:rPr lang="en-GB" smtClean="0"/>
               <a:t>‹#›</a:t>
             </a:fld>
-            <a:endParaRPr lang="en-US"/>
+            <a:endParaRPr lang="en-GB"/>
           </a:p>
         </p:txBody>
       </p:sp>
     </p:spTree>
+    <p:extLst>
+      <p:ext uri="{BB962C8B-B14F-4D97-AF65-F5344CB8AC3E}">
+        <p14:creationId xmlns:p14="http://schemas.microsoft.com/office/powerpoint/2010/main" val="216719877"/>
+      </p:ext>
+    </p:extLst>
   </p:cSld>
   <p:clrMapOvr>
     <a:masterClrMapping/>
@@ -774,7 +685,7 @@
               <a:rPr lang="en-US" smtClean="0"/>
               <a:t>Click to edit Master title style</a:t>
             </a:r>
-            <a:endParaRPr lang="en-US"/>
+            <a:endParaRPr lang="en-GB"/>
           </a:p>
         </p:txBody>
       </p:sp>
@@ -826,7 +737,7 @@
               <a:rPr lang="en-US" smtClean="0"/>
               <a:t>Fifth level</a:t>
             </a:r>
-            <a:endParaRPr lang="en-US"/>
+            <a:endParaRPr lang="en-GB"/>
           </a:p>
         </p:txBody>
       </p:sp>
@@ -840,25 +751,16 @@
             <p:ph type="dt" sz="half" idx="10"/>
           </p:nvPr>
         </p:nvSpPr>
-        <p:spPr>
-          <a:xfrm>
-            <a:off x="457200" y="6356350"/>
-            <a:ext cx="2133600" cy="365125"/>
-          </a:xfrm>
-          <a:prstGeom prst="rect">
-            <a:avLst/>
-          </a:prstGeom>
-        </p:spPr>
-        <p:txBody>
-          <a:bodyPr/>
-          <a:lstStyle/>
-          <a:p>
-            <a:fld id="{1D8BD707-D9CF-40AE-B4C6-C98DA3205C09}" type="datetimeFigureOut">
-              <a:rPr lang="en-US" smtClean="0"/>
-              <a:pPr/>
-              <a:t>10/1/2013</a:t>
+        <p:spPr/>
+        <p:txBody>
+          <a:bodyPr/>
+          <a:lstStyle/>
+          <a:p>
+            <a:fld id="{58872975-F9EA-4892-8CC1-BA199BA7DB51}" type="datetimeFigureOut">
+              <a:rPr lang="en-GB" smtClean="0"/>
+              <a:t>17/03/2015</a:t>
             </a:fld>
-            <a:endParaRPr lang="en-US"/>
+            <a:endParaRPr lang="en-GB"/>
           </a:p>
         </p:txBody>
       </p:sp>
@@ -872,20 +774,12 @@
             <p:ph type="ftr" sz="quarter" idx="11"/>
           </p:nvPr>
         </p:nvSpPr>
-        <p:spPr>
-          <a:xfrm>
-            <a:off x="3124200" y="6356350"/>
-            <a:ext cx="2895600" cy="365125"/>
-          </a:xfrm>
-          <a:prstGeom prst="rect">
-            <a:avLst/>
-          </a:prstGeom>
-        </p:spPr>
-        <p:txBody>
-          <a:bodyPr/>
-          <a:lstStyle/>
-          <a:p>
-            <a:endParaRPr lang="en-US"/>
+        <p:spPr/>
+        <p:txBody>
+          <a:bodyPr/>
+          <a:lstStyle/>
+          <a:p>
+            <a:endParaRPr lang="en-GB"/>
           </a:p>
         </p:txBody>
       </p:sp>
@@ -904,16 +798,20 @@
           <a:bodyPr/>
           <a:lstStyle/>
           <a:p>
-            <a:fld id="{B6F15528-21DE-4FAA-801E-634DDDAF4B2B}" type="slidenum">
-              <a:rPr lang="en-US" smtClean="0"/>
-              <a:pPr/>
+            <a:fld id="{9724F7C2-7A76-419E-9588-C9F0D560C6E9}" type="slidenum">
+              <a:rPr lang="en-GB" smtClean="0"/>
               <a:t>‹#›</a:t>
             </a:fld>
-            <a:endParaRPr lang="en-US"/>
+            <a:endParaRPr lang="en-GB"/>
           </a:p>
         </p:txBody>
       </p:sp>
     </p:spTree>
+    <p:extLst>
+      <p:ext uri="{BB962C8B-B14F-4D97-AF65-F5344CB8AC3E}">
+        <p14:creationId xmlns:p14="http://schemas.microsoft.com/office/powerpoint/2010/main" val="304219162"/>
+      </p:ext>
+    </p:extLst>
   </p:cSld>
   <p:clrMapOvr>
     <a:masterClrMapping/>
@@ -950,15 +848,15 @@
         </p:nvSpPr>
         <p:spPr>
           <a:xfrm>
-            <a:off x="722313" y="4406900"/>
-            <a:ext cx="7772400" cy="1362075"/>
+            <a:off x="831850" y="1709738"/>
+            <a:ext cx="10515600" cy="2852737"/>
           </a:xfrm>
         </p:spPr>
         <p:txBody>
-          <a:bodyPr anchor="t"/>
+          <a:bodyPr anchor="b"/>
           <a:lstStyle>
-            <a:lvl1pPr algn="l">
-              <a:defRPr sz="4000" b="1" cap="all"/>
+            <a:lvl1pPr>
+              <a:defRPr sz="6000"/>
             </a:lvl1pPr>
           </a:lstStyle>
           <a:p>
@@ -966,7 +864,7 @@
               <a:rPr lang="en-US" smtClean="0"/>
               <a:t>Click to edit Master title style</a:t>
             </a:r>
-            <a:endParaRPr lang="en-US"/>
+            <a:endParaRPr lang="en-GB"/>
           </a:p>
         </p:txBody>
       </p:sp>
@@ -982,16 +880,16 @@
         </p:nvSpPr>
         <p:spPr>
           <a:xfrm>
-            <a:off x="722313" y="2906713"/>
-            <a:ext cx="7772400" cy="1500187"/>
+            <a:off x="831850" y="4589463"/>
+            <a:ext cx="10515600" cy="1500187"/>
           </a:xfrm>
         </p:spPr>
         <p:txBody>
-          <a:bodyPr anchor="b"/>
+          <a:bodyPr/>
           <a:lstStyle>
             <a:lvl1pPr marL="0" indent="0">
               <a:buNone/>
-              <a:defRPr sz="2000">
+              <a:defRPr sz="2400">
                 <a:solidFill>
                   <a:schemeClr val="tx1">
                     <a:tint val="75000"/>
@@ -1001,7 +899,7 @@
             </a:lvl1pPr>
             <a:lvl2pPr marL="457200" indent="0">
               <a:buNone/>
-              <a:defRPr sz="1800">
+              <a:defRPr sz="2000">
                 <a:solidFill>
                   <a:schemeClr val="tx1">
                     <a:tint val="75000"/>
@@ -1011,7 +909,7 @@
             </a:lvl2pPr>
             <a:lvl3pPr marL="914400" indent="0">
               <a:buNone/>
-              <a:defRPr sz="1600">
+              <a:defRPr sz="1800">
                 <a:solidFill>
                   <a:schemeClr val="tx1">
                     <a:tint val="75000"/>
@@ -1021,7 +919,7 @@
             </a:lvl3pPr>
             <a:lvl4pPr marL="1371600" indent="0">
               <a:buNone/>
-              <a:defRPr sz="1400">
+              <a:defRPr sz="1600">
                 <a:solidFill>
                   <a:schemeClr val="tx1">
                     <a:tint val="75000"/>
@@ -1031,7 +929,7 @@
             </a:lvl4pPr>
             <a:lvl5pPr marL="1828800" indent="0">
               <a:buNone/>
-              <a:defRPr sz="1400">
+              <a:defRPr sz="1600">
                 <a:solidFill>
                   <a:schemeClr val="tx1">
                     <a:tint val="75000"/>
@@ -1041,7 +939,7 @@
             </a:lvl5pPr>
             <a:lvl6pPr marL="2286000" indent="0">
               <a:buNone/>
-              <a:defRPr sz="1400">
+              <a:defRPr sz="1600">
                 <a:solidFill>
                   <a:schemeClr val="tx1">
                     <a:tint val="75000"/>
@@ -1051,7 +949,7 @@
             </a:lvl6pPr>
             <a:lvl7pPr marL="2743200" indent="0">
               <a:buNone/>
-              <a:defRPr sz="1400">
+              <a:defRPr sz="1600">
                 <a:solidFill>
                   <a:schemeClr val="tx1">
                     <a:tint val="75000"/>
@@ -1061,7 +959,7 @@
             </a:lvl7pPr>
             <a:lvl8pPr marL="3200400" indent="0">
               <a:buNone/>
-              <a:defRPr sz="1400">
+              <a:defRPr sz="1600">
                 <a:solidFill>
                   <a:schemeClr val="tx1">
                     <a:tint val="75000"/>
@@ -1071,7 +969,7 @@
             </a:lvl8pPr>
             <a:lvl9pPr marL="3657600" indent="0">
               <a:buNone/>
-              <a:defRPr sz="1400">
+              <a:defRPr sz="1600">
                 <a:solidFill>
                   <a:schemeClr val="tx1">
                     <a:tint val="75000"/>
@@ -1099,25 +997,16 @@
             <p:ph type="dt" sz="half" idx="10"/>
           </p:nvPr>
         </p:nvSpPr>
-        <p:spPr>
-          <a:xfrm>
-            <a:off x="457200" y="6356350"/>
-            <a:ext cx="2133600" cy="365125"/>
-          </a:xfrm>
-          <a:prstGeom prst="rect">
-            <a:avLst/>
-          </a:prstGeom>
-        </p:spPr>
-        <p:txBody>
-          <a:bodyPr/>
-          <a:lstStyle/>
-          <a:p>
-            <a:fld id="{1D8BD707-D9CF-40AE-B4C6-C98DA3205C09}" type="datetimeFigureOut">
-              <a:rPr lang="en-US" smtClean="0"/>
-              <a:pPr/>
-              <a:t>10/1/2013</a:t>
+        <p:spPr/>
+        <p:txBody>
+          <a:bodyPr/>
+          <a:lstStyle/>
+          <a:p>
+            <a:fld id="{58872975-F9EA-4892-8CC1-BA199BA7DB51}" type="datetimeFigureOut">
+              <a:rPr lang="en-GB" smtClean="0"/>
+              <a:t>17/03/2015</a:t>
             </a:fld>
-            <a:endParaRPr lang="en-US"/>
+            <a:endParaRPr lang="en-GB"/>
           </a:p>
         </p:txBody>
       </p:sp>
@@ -1131,20 +1020,12 @@
             <p:ph type="ftr" sz="quarter" idx="11"/>
           </p:nvPr>
         </p:nvSpPr>
-        <p:spPr>
-          <a:xfrm>
-            <a:off x="3124200" y="6356350"/>
-            <a:ext cx="2895600" cy="365125"/>
-          </a:xfrm>
-          <a:prstGeom prst="rect">
-            <a:avLst/>
-          </a:prstGeom>
-        </p:spPr>
-        <p:txBody>
-          <a:bodyPr/>
-          <a:lstStyle/>
-          <a:p>
-            <a:endParaRPr lang="en-US"/>
+        <p:spPr/>
+        <p:txBody>
+          <a:bodyPr/>
+          <a:lstStyle/>
+          <a:p>
+            <a:endParaRPr lang="en-GB"/>
           </a:p>
         </p:txBody>
       </p:sp>
@@ -1163,16 +1044,20 @@
           <a:bodyPr/>
           <a:lstStyle/>
           <a:p>
-            <a:fld id="{B6F15528-21DE-4FAA-801E-634DDDAF4B2B}" type="slidenum">
-              <a:rPr lang="en-US" smtClean="0"/>
-              <a:pPr/>
+            <a:fld id="{9724F7C2-7A76-419E-9588-C9F0D560C6E9}" type="slidenum">
+              <a:rPr lang="en-GB" smtClean="0"/>
               <a:t>‹#›</a:t>
             </a:fld>
-            <a:endParaRPr lang="en-US"/>
+            <a:endParaRPr lang="en-GB"/>
           </a:p>
         </p:txBody>
       </p:sp>
     </p:spTree>
+    <p:extLst>
+      <p:ext uri="{BB962C8B-B14F-4D97-AF65-F5344CB8AC3E}">
+        <p14:creationId xmlns:p14="http://schemas.microsoft.com/office/powerpoint/2010/main" val="2297147580"/>
+      </p:ext>
+    </p:extLst>
   </p:cSld>
   <p:clrMapOvr>
     <a:masterClrMapping/>
@@ -1216,7 +1101,7 @@
               <a:rPr lang="en-US" smtClean="0"/>
               <a:t>Click to edit Master title style</a:t>
             </a:r>
-            <a:endParaRPr lang="en-US"/>
+            <a:endParaRPr lang="en-GB"/>
           </a:p>
         </p:txBody>
       </p:sp>
@@ -1232,41 +1117,13 @@
         </p:nvSpPr>
         <p:spPr>
           <a:xfrm>
-            <a:off x="457200" y="1600200"/>
-            <a:ext cx="4038600" cy="4525963"/>
+            <a:off x="838200" y="1825625"/>
+            <a:ext cx="5181600" cy="4351338"/>
           </a:xfrm>
         </p:spPr>
         <p:txBody>
           <a:bodyPr/>
-          <a:lstStyle>
-            <a:lvl1pPr>
-              <a:defRPr sz="2800"/>
-            </a:lvl1pPr>
-            <a:lvl2pPr>
-              <a:defRPr sz="2400"/>
-            </a:lvl2pPr>
-            <a:lvl3pPr>
-              <a:defRPr sz="2000"/>
-            </a:lvl3pPr>
-            <a:lvl4pPr>
-              <a:defRPr sz="1800"/>
-            </a:lvl4pPr>
-            <a:lvl5pPr>
-              <a:defRPr sz="1800"/>
-            </a:lvl5pPr>
-            <a:lvl6pPr>
-              <a:defRPr sz="1800"/>
-            </a:lvl6pPr>
-            <a:lvl7pPr>
-              <a:defRPr sz="1800"/>
-            </a:lvl7pPr>
-            <a:lvl8pPr>
-              <a:defRPr sz="1800"/>
-            </a:lvl8pPr>
-            <a:lvl9pPr>
-              <a:defRPr sz="1800"/>
-            </a:lvl9pPr>
-          </a:lstStyle>
+          <a:lstStyle/>
           <a:p>
             <a:pPr lvl="0"/>
             <a:r>
@@ -1301,7 +1158,7 @@
               <a:rPr lang="en-US" smtClean="0"/>
               <a:t>Fifth level</a:t>
             </a:r>
-            <a:endParaRPr lang="en-US"/>
+            <a:endParaRPr lang="en-GB"/>
           </a:p>
         </p:txBody>
       </p:sp>
@@ -1317,41 +1174,13 @@
         </p:nvSpPr>
         <p:spPr>
           <a:xfrm>
-            <a:off x="4648200" y="1600200"/>
-            <a:ext cx="4038600" cy="4525963"/>
+            <a:off x="6172200" y="1825625"/>
+            <a:ext cx="5181600" cy="4351338"/>
           </a:xfrm>
         </p:spPr>
         <p:txBody>
           <a:bodyPr/>
-          <a:lstStyle>
-            <a:lvl1pPr>
-              <a:defRPr sz="2800"/>
-            </a:lvl1pPr>
-            <a:lvl2pPr>
-              <a:defRPr sz="2400"/>
-            </a:lvl2pPr>
-            <a:lvl3pPr>
-              <a:defRPr sz="2000"/>
-            </a:lvl3pPr>
-            <a:lvl4pPr>
-              <a:defRPr sz="1800"/>
-            </a:lvl4pPr>
-            <a:lvl5pPr>
-              <a:defRPr sz="1800"/>
-            </a:lvl5pPr>
-            <a:lvl6pPr>
-              <a:defRPr sz="1800"/>
-            </a:lvl6pPr>
-            <a:lvl7pPr>
-              <a:defRPr sz="1800"/>
-            </a:lvl7pPr>
-            <a:lvl8pPr>
-              <a:defRPr sz="1800"/>
-            </a:lvl8pPr>
-            <a:lvl9pPr>
-              <a:defRPr sz="1800"/>
-            </a:lvl9pPr>
-          </a:lstStyle>
+          <a:lstStyle/>
           <a:p>
             <a:pPr lvl="0"/>
             <a:r>
@@ -1386,7 +1215,7 @@
               <a:rPr lang="en-US" smtClean="0"/>
               <a:t>Fifth level</a:t>
             </a:r>
-            <a:endParaRPr lang="en-US"/>
+            <a:endParaRPr lang="en-GB"/>
           </a:p>
         </p:txBody>
       </p:sp>
@@ -1400,25 +1229,16 @@
             <p:ph type="dt" sz="half" idx="10"/>
           </p:nvPr>
         </p:nvSpPr>
-        <p:spPr>
-          <a:xfrm>
-            <a:off x="457200" y="6356350"/>
-            <a:ext cx="2133600" cy="365125"/>
-          </a:xfrm>
-          <a:prstGeom prst="rect">
-            <a:avLst/>
-          </a:prstGeom>
-        </p:spPr>
-        <p:txBody>
-          <a:bodyPr/>
-          <a:lstStyle/>
-          <a:p>
-            <a:fld id="{1D8BD707-D9CF-40AE-B4C6-C98DA3205C09}" type="datetimeFigureOut">
-              <a:rPr lang="en-US" smtClean="0"/>
-              <a:pPr/>
-              <a:t>10/1/2013</a:t>
+        <p:spPr/>
+        <p:txBody>
+          <a:bodyPr/>
+          <a:lstStyle/>
+          <a:p>
+            <a:fld id="{58872975-F9EA-4892-8CC1-BA199BA7DB51}" type="datetimeFigureOut">
+              <a:rPr lang="en-GB" smtClean="0"/>
+              <a:t>17/03/2015</a:t>
             </a:fld>
-            <a:endParaRPr lang="en-US"/>
+            <a:endParaRPr lang="en-GB"/>
           </a:p>
         </p:txBody>
       </p:sp>
@@ -1432,20 +1252,12 @@
             <p:ph type="ftr" sz="quarter" idx="11"/>
           </p:nvPr>
         </p:nvSpPr>
-        <p:spPr>
-          <a:xfrm>
-            <a:off x="3124200" y="6356350"/>
-            <a:ext cx="2895600" cy="365125"/>
-          </a:xfrm>
-          <a:prstGeom prst="rect">
-            <a:avLst/>
-          </a:prstGeom>
-        </p:spPr>
-        <p:txBody>
-          <a:bodyPr/>
-          <a:lstStyle/>
-          <a:p>
-            <a:endParaRPr lang="en-US"/>
+        <p:spPr/>
+        <p:txBody>
+          <a:bodyPr/>
+          <a:lstStyle/>
+          <a:p>
+            <a:endParaRPr lang="en-GB"/>
           </a:p>
         </p:txBody>
       </p:sp>
@@ -1464,16 +1276,20 @@
           <a:bodyPr/>
           <a:lstStyle/>
           <a:p>
-            <a:fld id="{B6F15528-21DE-4FAA-801E-634DDDAF4B2B}" type="slidenum">
-              <a:rPr lang="en-US" smtClean="0"/>
-              <a:pPr/>
+            <a:fld id="{9724F7C2-7A76-419E-9588-C9F0D560C6E9}" type="slidenum">
+              <a:rPr lang="en-GB" smtClean="0"/>
               <a:t>‹#›</a:t>
             </a:fld>
-            <a:endParaRPr lang="en-US"/>
+            <a:endParaRPr lang="en-GB"/>
           </a:p>
         </p:txBody>
       </p:sp>
     </p:spTree>
+    <p:extLst>
+      <p:ext uri="{BB962C8B-B14F-4D97-AF65-F5344CB8AC3E}">
+        <p14:creationId xmlns:p14="http://schemas.microsoft.com/office/powerpoint/2010/main" val="3018933598"/>
+      </p:ext>
+    </p:extLst>
   </p:cSld>
   <p:clrMapOvr>
     <a:masterClrMapping/>
@@ -1508,37 +1324,38 @@
             <p:ph type="title"/>
           </p:nvPr>
         </p:nvSpPr>
-        <p:spPr/>
-        <p:txBody>
-          <a:bodyPr/>
-          <a:lstStyle>
-            <a:lvl1pPr>
-              <a:defRPr/>
-            </a:lvl1pPr>
-          </a:lstStyle>
-          <a:p>
-            <a:r>
-              <a:rPr lang="en-US" smtClean="0"/>
-              <a:t>Click to edit Master title style</a:t>
-            </a:r>
-            <a:endParaRPr lang="en-US"/>
-          </a:p>
-        </p:txBody>
-      </p:sp>
-      <p:sp>
-        <p:nvSpPr>
-          <p:cNvPr id="3" name="Text Placeholder 2"/>
-          <p:cNvSpPr>
-            <a:spLocks noGrp="1"/>
-          </p:cNvSpPr>
-          <p:nvPr>
-            <p:ph type="body" idx="1"/>
-          </p:nvPr>
-        </p:nvSpPr>
         <p:spPr>
           <a:xfrm>
-            <a:off x="457200" y="1535113"/>
-            <a:ext cx="4040188" cy="639762"/>
+            <a:off x="839788" y="365125"/>
+            <a:ext cx="10515600" cy="1325563"/>
+          </a:xfrm>
+        </p:spPr>
+        <p:txBody>
+          <a:bodyPr/>
+          <a:lstStyle/>
+          <a:p>
+            <a:r>
+              <a:rPr lang="en-US" smtClean="0"/>
+              <a:t>Click to edit Master title style</a:t>
+            </a:r>
+            <a:endParaRPr lang="en-GB"/>
+          </a:p>
+        </p:txBody>
+      </p:sp>
+      <p:sp>
+        <p:nvSpPr>
+          <p:cNvPr id="3" name="Text Placeholder 2"/>
+          <p:cNvSpPr>
+            <a:spLocks noGrp="1"/>
+          </p:cNvSpPr>
+          <p:nvPr>
+            <p:ph type="body" idx="1"/>
+          </p:nvPr>
+        </p:nvSpPr>
+        <p:spPr>
+          <a:xfrm>
+            <a:off x="839788" y="1681163"/>
+            <a:ext cx="5157787" cy="823912"/>
           </a:xfrm>
         </p:spPr>
         <p:txBody>
@@ -1602,41 +1419,13 @@
         </p:nvSpPr>
         <p:spPr>
           <a:xfrm>
-            <a:off x="457200" y="2174875"/>
-            <a:ext cx="4040188" cy="3951288"/>
+            <a:off x="839788" y="2505075"/>
+            <a:ext cx="5157787" cy="3684588"/>
           </a:xfrm>
         </p:spPr>
         <p:txBody>
           <a:bodyPr/>
-          <a:lstStyle>
-            <a:lvl1pPr>
-              <a:defRPr sz="2400"/>
-            </a:lvl1pPr>
-            <a:lvl2pPr>
-              <a:defRPr sz="2000"/>
-            </a:lvl2pPr>
-            <a:lvl3pPr>
-              <a:defRPr sz="1800"/>
-            </a:lvl3pPr>
-            <a:lvl4pPr>
-              <a:defRPr sz="1600"/>
-            </a:lvl4pPr>
-            <a:lvl5pPr>
-              <a:defRPr sz="1600"/>
-            </a:lvl5pPr>
-            <a:lvl6pPr>
-              <a:defRPr sz="1600"/>
-            </a:lvl6pPr>
-            <a:lvl7pPr>
-              <a:defRPr sz="1600"/>
-            </a:lvl7pPr>
-            <a:lvl8pPr>
-              <a:defRPr sz="1600"/>
-            </a:lvl8pPr>
-            <a:lvl9pPr>
-              <a:defRPr sz="1600"/>
-            </a:lvl9pPr>
-          </a:lstStyle>
+          <a:lstStyle/>
           <a:p>
             <a:pPr lvl="0"/>
             <a:r>
@@ -1671,7 +1460,7 @@
               <a:rPr lang="en-US" smtClean="0"/>
               <a:t>Fifth level</a:t>
             </a:r>
-            <a:endParaRPr lang="en-US"/>
+            <a:endParaRPr lang="en-GB"/>
           </a:p>
         </p:txBody>
       </p:sp>
@@ -1687,8 +1476,8 @@
         </p:nvSpPr>
         <p:spPr>
           <a:xfrm>
-            <a:off x="4645025" y="1535113"/>
-            <a:ext cx="4041775" cy="639762"/>
+            <a:off x="6172200" y="1681163"/>
+            <a:ext cx="5183188" cy="823912"/>
           </a:xfrm>
         </p:spPr>
         <p:txBody>
@@ -1752,41 +1541,13 @@
         </p:nvSpPr>
         <p:spPr>
           <a:xfrm>
-            <a:off x="4645025" y="2174875"/>
-            <a:ext cx="4041775" cy="3951288"/>
+            <a:off x="6172200" y="2505075"/>
+            <a:ext cx="5183188" cy="3684588"/>
           </a:xfrm>
         </p:spPr>
         <p:txBody>
           <a:bodyPr/>
-          <a:lstStyle>
-            <a:lvl1pPr>
-              <a:defRPr sz="2400"/>
-            </a:lvl1pPr>
-            <a:lvl2pPr>
-              <a:defRPr sz="2000"/>
-            </a:lvl2pPr>
-            <a:lvl3pPr>
-              <a:defRPr sz="1800"/>
-            </a:lvl3pPr>
-            <a:lvl4pPr>
-              <a:defRPr sz="1600"/>
-            </a:lvl4pPr>
-            <a:lvl5pPr>
-              <a:defRPr sz="1600"/>
-            </a:lvl5pPr>
-            <a:lvl6pPr>
-              <a:defRPr sz="1600"/>
-            </a:lvl6pPr>
-            <a:lvl7pPr>
-              <a:defRPr sz="1600"/>
-            </a:lvl7pPr>
-            <a:lvl8pPr>
-              <a:defRPr sz="1600"/>
-            </a:lvl8pPr>
-            <a:lvl9pPr>
-              <a:defRPr sz="1600"/>
-            </a:lvl9pPr>
-          </a:lstStyle>
+          <a:lstStyle/>
           <a:p>
             <a:pPr lvl="0"/>
             <a:r>
@@ -1821,7 +1582,7 @@
               <a:rPr lang="en-US" smtClean="0"/>
               <a:t>Fifth level</a:t>
             </a:r>
-            <a:endParaRPr lang="en-US"/>
+            <a:endParaRPr lang="en-GB"/>
           </a:p>
         </p:txBody>
       </p:sp>
@@ -1835,25 +1596,16 @@
             <p:ph type="dt" sz="half" idx="10"/>
           </p:nvPr>
         </p:nvSpPr>
-        <p:spPr>
-          <a:xfrm>
-            <a:off x="457200" y="6356350"/>
-            <a:ext cx="2133600" cy="365125"/>
-          </a:xfrm>
-          <a:prstGeom prst="rect">
-            <a:avLst/>
-          </a:prstGeom>
-        </p:spPr>
-        <p:txBody>
-          <a:bodyPr/>
-          <a:lstStyle/>
-          <a:p>
-            <a:fld id="{1D8BD707-D9CF-40AE-B4C6-C98DA3205C09}" type="datetimeFigureOut">
-              <a:rPr lang="en-US" smtClean="0"/>
-              <a:pPr/>
-              <a:t>10/1/2013</a:t>
+        <p:spPr/>
+        <p:txBody>
+          <a:bodyPr/>
+          <a:lstStyle/>
+          <a:p>
+            <a:fld id="{58872975-F9EA-4892-8CC1-BA199BA7DB51}" type="datetimeFigureOut">
+              <a:rPr lang="en-GB" smtClean="0"/>
+              <a:t>17/03/2015</a:t>
             </a:fld>
-            <a:endParaRPr lang="en-US"/>
+            <a:endParaRPr lang="en-GB"/>
           </a:p>
         </p:txBody>
       </p:sp>
@@ -1867,20 +1619,12 @@
             <p:ph type="ftr" sz="quarter" idx="11"/>
           </p:nvPr>
         </p:nvSpPr>
-        <p:spPr>
-          <a:xfrm>
-            <a:off x="3124200" y="6356350"/>
-            <a:ext cx="2895600" cy="365125"/>
-          </a:xfrm>
-          <a:prstGeom prst="rect">
-            <a:avLst/>
-          </a:prstGeom>
-        </p:spPr>
-        <p:txBody>
-          <a:bodyPr/>
-          <a:lstStyle/>
-          <a:p>
-            <a:endParaRPr lang="en-US"/>
+        <p:spPr/>
+        <p:txBody>
+          <a:bodyPr/>
+          <a:lstStyle/>
+          <a:p>
+            <a:endParaRPr lang="en-GB"/>
           </a:p>
         </p:txBody>
       </p:sp>
@@ -1899,16 +1643,20 @@
           <a:bodyPr/>
           <a:lstStyle/>
           <a:p>
-            <a:fld id="{B6F15528-21DE-4FAA-801E-634DDDAF4B2B}" type="slidenum">
-              <a:rPr lang="en-US" smtClean="0"/>
-              <a:pPr/>
+            <a:fld id="{9724F7C2-7A76-419E-9588-C9F0D560C6E9}" type="slidenum">
+              <a:rPr lang="en-GB" smtClean="0"/>
               <a:t>‹#›</a:t>
             </a:fld>
-            <a:endParaRPr lang="en-US"/>
+            <a:endParaRPr lang="en-GB"/>
           </a:p>
         </p:txBody>
       </p:sp>
     </p:spTree>
+    <p:extLst>
+      <p:ext uri="{BB962C8B-B14F-4D97-AF65-F5344CB8AC3E}">
+        <p14:creationId xmlns:p14="http://schemas.microsoft.com/office/powerpoint/2010/main" val="3706994728"/>
+      </p:ext>
+    </p:extLst>
   </p:cSld>
   <p:clrMapOvr>
     <a:masterClrMapping/>
@@ -1952,7 +1700,7 @@
               <a:rPr lang="en-US" smtClean="0"/>
               <a:t>Click to edit Master title style</a:t>
             </a:r>
-            <a:endParaRPr lang="en-US"/>
+            <a:endParaRPr lang="en-GB"/>
           </a:p>
         </p:txBody>
       </p:sp>
@@ -1966,25 +1714,16 @@
             <p:ph type="dt" sz="half" idx="10"/>
           </p:nvPr>
         </p:nvSpPr>
-        <p:spPr>
-          <a:xfrm>
-            <a:off x="457200" y="6356350"/>
-            <a:ext cx="2133600" cy="365125"/>
-          </a:xfrm>
-          <a:prstGeom prst="rect">
-            <a:avLst/>
-          </a:prstGeom>
-        </p:spPr>
-        <p:txBody>
-          <a:bodyPr/>
-          <a:lstStyle/>
-          <a:p>
-            <a:fld id="{1D8BD707-D9CF-40AE-B4C6-C98DA3205C09}" type="datetimeFigureOut">
-              <a:rPr lang="en-US" smtClean="0"/>
-              <a:pPr/>
-              <a:t>10/1/2013</a:t>
+        <p:spPr/>
+        <p:txBody>
+          <a:bodyPr/>
+          <a:lstStyle/>
+          <a:p>
+            <a:fld id="{58872975-F9EA-4892-8CC1-BA199BA7DB51}" type="datetimeFigureOut">
+              <a:rPr lang="en-GB" smtClean="0"/>
+              <a:t>17/03/2015</a:t>
             </a:fld>
-            <a:endParaRPr lang="en-US"/>
+            <a:endParaRPr lang="en-GB"/>
           </a:p>
         </p:txBody>
       </p:sp>
@@ -1998,20 +1737,12 @@
             <p:ph type="ftr" sz="quarter" idx="11"/>
           </p:nvPr>
         </p:nvSpPr>
-        <p:spPr>
-          <a:xfrm>
-            <a:off x="3124200" y="6356350"/>
-            <a:ext cx="2895600" cy="365125"/>
-          </a:xfrm>
-          <a:prstGeom prst="rect">
-            <a:avLst/>
-          </a:prstGeom>
-        </p:spPr>
-        <p:txBody>
-          <a:bodyPr/>
-          <a:lstStyle/>
-          <a:p>
-            <a:endParaRPr lang="en-US"/>
+        <p:spPr/>
+        <p:txBody>
+          <a:bodyPr/>
+          <a:lstStyle/>
+          <a:p>
+            <a:endParaRPr lang="en-GB"/>
           </a:p>
         </p:txBody>
       </p:sp>
@@ -2030,16 +1761,20 @@
           <a:bodyPr/>
           <a:lstStyle/>
           <a:p>
-            <a:fld id="{B6F15528-21DE-4FAA-801E-634DDDAF4B2B}" type="slidenum">
-              <a:rPr lang="en-US" smtClean="0"/>
-              <a:pPr/>
+            <a:fld id="{9724F7C2-7A76-419E-9588-C9F0D560C6E9}" type="slidenum">
+              <a:rPr lang="en-GB" smtClean="0"/>
               <a:t>‹#›</a:t>
             </a:fld>
-            <a:endParaRPr lang="en-US"/>
+            <a:endParaRPr lang="en-GB"/>
           </a:p>
         </p:txBody>
       </p:sp>
     </p:spTree>
+    <p:extLst>
+      <p:ext uri="{BB962C8B-B14F-4D97-AF65-F5344CB8AC3E}">
+        <p14:creationId xmlns:p14="http://schemas.microsoft.com/office/powerpoint/2010/main" val="1508289093"/>
+      </p:ext>
+    </p:extLst>
   </p:cSld>
   <p:clrMapOvr>
     <a:masterClrMapping/>
@@ -2066,155 +1801,75 @@
       </p:grpSpPr>
       <p:sp>
         <p:nvSpPr>
-          <p:cNvPr id="6" name="TextBox 5"/>
-          <p:cNvSpPr txBox="1"/>
-          <p:nvPr userDrawn="1"/>
-        </p:nvSpPr>
-        <p:spPr>
-          <a:xfrm>
-            <a:off x="7451725" y="6370638"/>
-            <a:ext cx="1584325" cy="338137"/>
-          </a:xfrm>
-          <a:prstGeom prst="rect">
-            <a:avLst/>
-          </a:prstGeom>
-          <a:noFill/>
-        </p:spPr>
-        <p:txBody>
-          <a:bodyPr>
-            <a:spAutoFit/>
-          </a:bodyPr>
-          <a:lstStyle>
-            <a:lvl1pPr eaLnBrk="0" hangingPunct="0">
-              <a:defRPr>
-                <a:solidFill>
-                  <a:schemeClr val="tx1"/>
-                </a:solidFill>
-                <a:latin typeface="Arial" charset="0"/>
-                <a:cs typeface="Arial" charset="0"/>
-              </a:defRPr>
-            </a:lvl1pPr>
-            <a:lvl2pPr marL="742950" indent="-285750" eaLnBrk="0" hangingPunct="0">
-              <a:defRPr>
-                <a:solidFill>
-                  <a:schemeClr val="tx1"/>
-                </a:solidFill>
-                <a:latin typeface="Arial" charset="0"/>
-                <a:cs typeface="Arial" charset="0"/>
-              </a:defRPr>
-            </a:lvl2pPr>
-            <a:lvl3pPr marL="1143000" indent="-228600" eaLnBrk="0" hangingPunct="0">
-              <a:defRPr>
-                <a:solidFill>
-                  <a:schemeClr val="tx1"/>
-                </a:solidFill>
-                <a:latin typeface="Arial" charset="0"/>
-                <a:cs typeface="Arial" charset="0"/>
-              </a:defRPr>
-            </a:lvl3pPr>
-            <a:lvl4pPr marL="1600200" indent="-228600" eaLnBrk="0" hangingPunct="0">
-              <a:defRPr>
-                <a:solidFill>
-                  <a:schemeClr val="tx1"/>
-                </a:solidFill>
-                <a:latin typeface="Arial" charset="0"/>
-                <a:cs typeface="Arial" charset="0"/>
-              </a:defRPr>
-            </a:lvl4pPr>
-            <a:lvl5pPr marL="2057400" indent="-228600" eaLnBrk="0" hangingPunct="0">
-              <a:defRPr>
-                <a:solidFill>
-                  <a:schemeClr val="tx1"/>
-                </a:solidFill>
-                <a:latin typeface="Arial" charset="0"/>
-                <a:cs typeface="Arial" charset="0"/>
-              </a:defRPr>
-            </a:lvl5pPr>
-            <a:lvl6pPr marL="2514600" indent="-228600" eaLnBrk="0" fontAlgn="base" hangingPunct="0">
-              <a:spcBef>
-                <a:spcPct val="0"/>
-              </a:spcBef>
-              <a:spcAft>
-                <a:spcPct val="0"/>
-              </a:spcAft>
-              <a:defRPr>
-                <a:solidFill>
-                  <a:schemeClr val="tx1"/>
-                </a:solidFill>
-                <a:latin typeface="Arial" charset="0"/>
-                <a:cs typeface="Arial" charset="0"/>
-              </a:defRPr>
-            </a:lvl6pPr>
-            <a:lvl7pPr marL="2971800" indent="-228600" eaLnBrk="0" fontAlgn="base" hangingPunct="0">
-              <a:spcBef>
-                <a:spcPct val="0"/>
-              </a:spcBef>
-              <a:spcAft>
-                <a:spcPct val="0"/>
-              </a:spcAft>
-              <a:defRPr>
-                <a:solidFill>
-                  <a:schemeClr val="tx1"/>
-                </a:solidFill>
-                <a:latin typeface="Arial" charset="0"/>
-                <a:cs typeface="Arial" charset="0"/>
-              </a:defRPr>
-            </a:lvl7pPr>
-            <a:lvl8pPr marL="3429000" indent="-228600" eaLnBrk="0" fontAlgn="base" hangingPunct="0">
-              <a:spcBef>
-                <a:spcPct val="0"/>
-              </a:spcBef>
-              <a:spcAft>
-                <a:spcPct val="0"/>
-              </a:spcAft>
-              <a:defRPr>
-                <a:solidFill>
-                  <a:schemeClr val="tx1"/>
-                </a:solidFill>
-                <a:latin typeface="Arial" charset="0"/>
-                <a:cs typeface="Arial" charset="0"/>
-              </a:defRPr>
-            </a:lvl8pPr>
-            <a:lvl9pPr marL="3886200" indent="-228600" eaLnBrk="0" fontAlgn="base" hangingPunct="0">
-              <a:spcBef>
-                <a:spcPct val="0"/>
-              </a:spcBef>
-              <a:spcAft>
-                <a:spcPct val="0"/>
-              </a:spcAft>
-              <a:defRPr>
-                <a:solidFill>
-                  <a:schemeClr val="tx1"/>
-                </a:solidFill>
-                <a:latin typeface="Arial" charset="0"/>
-                <a:cs typeface="Arial" charset="0"/>
-              </a:defRPr>
-            </a:lvl9pPr>
-          </a:lstStyle>
-          <a:p>
-            <a:pPr algn="r" eaLnBrk="1" hangingPunct="1">
-              <a:defRPr/>
-            </a:pPr>
-            <a:fld id="{32B09570-72AE-41A3-B688-8F1A6F486BC4}" type="slidenum">
-              <a:rPr lang="en-GB" sz="1600">
-                <a:solidFill>
-                  <a:schemeClr val="bg1"/>
-                </a:solidFill>
-              </a:rPr>
-              <a:pPr algn="r" eaLnBrk="1" hangingPunct="1">
-                <a:defRPr/>
-              </a:pPr>
+          <p:cNvPr id="2" name="Date Placeholder 1"/>
+          <p:cNvSpPr>
+            <a:spLocks noGrp="1"/>
+          </p:cNvSpPr>
+          <p:nvPr>
+            <p:ph type="dt" sz="half" idx="10"/>
+          </p:nvPr>
+        </p:nvSpPr>
+        <p:spPr/>
+        <p:txBody>
+          <a:bodyPr/>
+          <a:lstStyle/>
+          <a:p>
+            <a:fld id="{58872975-F9EA-4892-8CC1-BA199BA7DB51}" type="datetimeFigureOut">
+              <a:rPr lang="en-GB" smtClean="0"/>
+              <a:t>17/03/2015</a:t>
+            </a:fld>
+            <a:endParaRPr lang="en-GB"/>
+          </a:p>
+        </p:txBody>
+      </p:sp>
+      <p:sp>
+        <p:nvSpPr>
+          <p:cNvPr id="3" name="Footer Placeholder 2"/>
+          <p:cNvSpPr>
+            <a:spLocks noGrp="1"/>
+          </p:cNvSpPr>
+          <p:nvPr>
+            <p:ph type="ftr" sz="quarter" idx="11"/>
+          </p:nvPr>
+        </p:nvSpPr>
+        <p:spPr/>
+        <p:txBody>
+          <a:bodyPr/>
+          <a:lstStyle/>
+          <a:p>
+            <a:endParaRPr lang="en-GB"/>
+          </a:p>
+        </p:txBody>
+      </p:sp>
+      <p:sp>
+        <p:nvSpPr>
+          <p:cNvPr id="4" name="Slide Number Placeholder 3"/>
+          <p:cNvSpPr>
+            <a:spLocks noGrp="1"/>
+          </p:cNvSpPr>
+          <p:nvPr>
+            <p:ph type="sldNum" sz="quarter" idx="12"/>
+          </p:nvPr>
+        </p:nvSpPr>
+        <p:spPr/>
+        <p:txBody>
+          <a:bodyPr/>
+          <a:lstStyle/>
+          <a:p>
+            <a:fld id="{9724F7C2-7A76-419E-9588-C9F0D560C6E9}" type="slidenum">
+              <a:rPr lang="en-GB" smtClean="0"/>
               <a:t>‹#›</a:t>
             </a:fld>
-            <a:endParaRPr lang="en-GB" sz="1600" dirty="0">
-              <a:solidFill>
-                <a:schemeClr val="bg1"/>
-              </a:solidFill>
-            </a:endParaRPr>
+            <a:endParaRPr lang="en-GB"/>
           </a:p>
         </p:txBody>
       </p:sp>
     </p:spTree>
+    <p:extLst>
+      <p:ext uri="{BB962C8B-B14F-4D97-AF65-F5344CB8AC3E}">
+        <p14:creationId xmlns:p14="http://schemas.microsoft.com/office/powerpoint/2010/main" val="539287022"/>
+      </p:ext>
+    </p:extLst>
   </p:cSld>
   <p:clrMapOvr>
     <a:masterClrMapping/>
@@ -2251,15 +1906,15 @@
         </p:nvSpPr>
         <p:spPr>
           <a:xfrm>
-            <a:off x="457200" y="273050"/>
-            <a:ext cx="3008313" cy="1162050"/>
+            <a:off x="839788" y="457200"/>
+            <a:ext cx="3932237" cy="1600200"/>
           </a:xfrm>
         </p:spPr>
         <p:txBody>
           <a:bodyPr anchor="b"/>
           <a:lstStyle>
-            <a:lvl1pPr algn="l">
-              <a:defRPr sz="2000" b="1"/>
+            <a:lvl1pPr>
+              <a:defRPr sz="3200"/>
             </a:lvl1pPr>
           </a:lstStyle>
           <a:p>
@@ -2267,7 +1922,7 @@
               <a:rPr lang="en-US" smtClean="0"/>
               <a:t>Click to edit Master title style</a:t>
             </a:r>
-            <a:endParaRPr lang="en-US"/>
+            <a:endParaRPr lang="en-GB"/>
           </a:p>
         </p:txBody>
       </p:sp>
@@ -2283,8 +1938,8 @@
         </p:nvSpPr>
         <p:spPr>
           <a:xfrm>
-            <a:off x="3575050" y="273050"/>
-            <a:ext cx="5111750" cy="5853113"/>
+            <a:off x="5183188" y="987425"/>
+            <a:ext cx="6172200" cy="4873625"/>
           </a:xfrm>
         </p:spPr>
         <p:txBody>
@@ -2352,7 +2007,7 @@
               <a:rPr lang="en-US" smtClean="0"/>
               <a:t>Fifth level</a:t>
             </a:r>
-            <a:endParaRPr lang="en-US"/>
+            <a:endParaRPr lang="en-GB"/>
           </a:p>
         </p:txBody>
       </p:sp>
@@ -2368,8 +2023,8 @@
         </p:nvSpPr>
         <p:spPr>
           <a:xfrm>
-            <a:off x="457200" y="1435100"/>
-            <a:ext cx="3008313" cy="4691063"/>
+            <a:off x="839788" y="2057400"/>
+            <a:ext cx="3932237" cy="3811588"/>
           </a:xfrm>
         </p:spPr>
         <p:txBody>
@@ -2377,39 +2032,39 @@
           <a:lstStyle>
             <a:lvl1pPr marL="0" indent="0">
               <a:buNone/>
-              <a:defRPr sz="1400"/>
+              <a:defRPr sz="1600"/>
             </a:lvl1pPr>
             <a:lvl2pPr marL="457200" indent="0">
               <a:buNone/>
-              <a:defRPr sz="1200"/>
+              <a:defRPr sz="1400"/>
             </a:lvl2pPr>
             <a:lvl3pPr marL="914400" indent="0">
               <a:buNone/>
-              <a:defRPr sz="1000"/>
+              <a:defRPr sz="1200"/>
             </a:lvl3pPr>
             <a:lvl4pPr marL="1371600" indent="0">
               <a:buNone/>
-              <a:defRPr sz="900"/>
+              <a:defRPr sz="1000"/>
             </a:lvl4pPr>
             <a:lvl5pPr marL="1828800" indent="0">
               <a:buNone/>
-              <a:defRPr sz="900"/>
+              <a:defRPr sz="1000"/>
             </a:lvl5pPr>
             <a:lvl6pPr marL="2286000" indent="0">
               <a:buNone/>
-              <a:defRPr sz="900"/>
+              <a:defRPr sz="1000"/>
             </a:lvl6pPr>
             <a:lvl7pPr marL="2743200" indent="0">
               <a:buNone/>
-              <a:defRPr sz="900"/>
+              <a:defRPr sz="1000"/>
             </a:lvl7pPr>
             <a:lvl8pPr marL="3200400" indent="0">
               <a:buNone/>
-              <a:defRPr sz="900"/>
+              <a:defRPr sz="1000"/>
             </a:lvl8pPr>
             <a:lvl9pPr marL="3657600" indent="0">
               <a:buNone/>
-              <a:defRPr sz="900"/>
+              <a:defRPr sz="1000"/>
             </a:lvl9pPr>
           </a:lstStyle>
           <a:p>
@@ -2431,25 +2086,16 @@
             <p:ph type="dt" sz="half" idx="10"/>
           </p:nvPr>
         </p:nvSpPr>
-        <p:spPr>
-          <a:xfrm>
-            <a:off x="457200" y="6356350"/>
-            <a:ext cx="2133600" cy="365125"/>
-          </a:xfrm>
-          <a:prstGeom prst="rect">
-            <a:avLst/>
-          </a:prstGeom>
-        </p:spPr>
-        <p:txBody>
-          <a:bodyPr/>
-          <a:lstStyle/>
-          <a:p>
-            <a:fld id="{1D8BD707-D9CF-40AE-B4C6-C98DA3205C09}" type="datetimeFigureOut">
-              <a:rPr lang="en-US" smtClean="0"/>
-              <a:pPr/>
-              <a:t>10/1/2013</a:t>
+        <p:spPr/>
+        <p:txBody>
+          <a:bodyPr/>
+          <a:lstStyle/>
+          <a:p>
+            <a:fld id="{58872975-F9EA-4892-8CC1-BA199BA7DB51}" type="datetimeFigureOut">
+              <a:rPr lang="en-GB" smtClean="0"/>
+              <a:t>17/03/2015</a:t>
             </a:fld>
-            <a:endParaRPr lang="en-US"/>
+            <a:endParaRPr lang="en-GB"/>
           </a:p>
         </p:txBody>
       </p:sp>
@@ -2463,20 +2109,12 @@
             <p:ph type="ftr" sz="quarter" idx="11"/>
           </p:nvPr>
         </p:nvSpPr>
-        <p:spPr>
-          <a:xfrm>
-            <a:off x="3124200" y="6356350"/>
-            <a:ext cx="2895600" cy="365125"/>
-          </a:xfrm>
-          <a:prstGeom prst="rect">
-            <a:avLst/>
-          </a:prstGeom>
-        </p:spPr>
-        <p:txBody>
-          <a:bodyPr/>
-          <a:lstStyle/>
-          <a:p>
-            <a:endParaRPr lang="en-US"/>
+        <p:spPr/>
+        <p:txBody>
+          <a:bodyPr/>
+          <a:lstStyle/>
+          <a:p>
+            <a:endParaRPr lang="en-GB"/>
           </a:p>
         </p:txBody>
       </p:sp>
@@ -2495,16 +2133,20 @@
           <a:bodyPr/>
           <a:lstStyle/>
           <a:p>
-            <a:fld id="{B6F15528-21DE-4FAA-801E-634DDDAF4B2B}" type="slidenum">
-              <a:rPr lang="en-US" smtClean="0"/>
-              <a:pPr/>
+            <a:fld id="{9724F7C2-7A76-419E-9588-C9F0D560C6E9}" type="slidenum">
+              <a:rPr lang="en-GB" smtClean="0"/>
               <a:t>‹#›</a:t>
             </a:fld>
-            <a:endParaRPr lang="en-US"/>
+            <a:endParaRPr lang="en-GB"/>
           </a:p>
         </p:txBody>
       </p:sp>
     </p:spTree>
+    <p:extLst>
+      <p:ext uri="{BB962C8B-B14F-4D97-AF65-F5344CB8AC3E}">
+        <p14:creationId xmlns:p14="http://schemas.microsoft.com/office/powerpoint/2010/main" val="2198989846"/>
+      </p:ext>
+    </p:extLst>
   </p:cSld>
   <p:clrMapOvr>
     <a:masterClrMapping/>
@@ -2541,15 +2183,15 @@
         </p:nvSpPr>
         <p:spPr>
           <a:xfrm>
-            <a:off x="1792288" y="4800600"/>
-            <a:ext cx="5486400" cy="566738"/>
+            <a:off x="839788" y="457200"/>
+            <a:ext cx="3932237" cy="1600200"/>
           </a:xfrm>
         </p:spPr>
         <p:txBody>
           <a:bodyPr anchor="b"/>
           <a:lstStyle>
-            <a:lvl1pPr algn="l">
-              <a:defRPr sz="2000" b="1"/>
+            <a:lvl1pPr>
+              <a:defRPr sz="3200"/>
             </a:lvl1pPr>
           </a:lstStyle>
           <a:p>
@@ -2557,7 +2199,7 @@
               <a:rPr lang="en-US" smtClean="0"/>
               <a:t>Click to edit Master title style</a:t>
             </a:r>
-            <a:endParaRPr lang="en-US"/>
+            <a:endParaRPr lang="en-GB"/>
           </a:p>
         </p:txBody>
       </p:sp>
@@ -2573,8 +2215,8 @@
         </p:nvSpPr>
         <p:spPr>
           <a:xfrm>
-            <a:off x="1792288" y="612775"/>
-            <a:ext cx="5486400" cy="4114800"/>
+            <a:off x="5183188" y="987425"/>
+            <a:ext cx="6172200" cy="4873625"/>
           </a:xfrm>
         </p:spPr>
         <p:txBody>
@@ -2618,7 +2260,7 @@
             </a:lvl9pPr>
           </a:lstStyle>
           <a:p>
-            <a:endParaRPr lang="en-US"/>
+            <a:endParaRPr lang="en-GB"/>
           </a:p>
         </p:txBody>
       </p:sp>
@@ -2634,8 +2276,8 @@
         </p:nvSpPr>
         <p:spPr>
           <a:xfrm>
-            <a:off x="1792288" y="5367338"/>
-            <a:ext cx="5486400" cy="804862"/>
+            <a:off x="839788" y="2057400"/>
+            <a:ext cx="3932237" cy="3811588"/>
           </a:xfrm>
         </p:spPr>
         <p:txBody>
@@ -2643,39 +2285,39 @@
           <a:lstStyle>
             <a:lvl1pPr marL="0" indent="0">
               <a:buNone/>
-              <a:defRPr sz="1400"/>
+              <a:defRPr sz="1600"/>
             </a:lvl1pPr>
             <a:lvl2pPr marL="457200" indent="0">
               <a:buNone/>
-              <a:defRPr sz="1200"/>
+              <a:defRPr sz="1400"/>
             </a:lvl2pPr>
             <a:lvl3pPr marL="914400" indent="0">
               <a:buNone/>
-              <a:defRPr sz="1000"/>
+              <a:defRPr sz="1200"/>
             </a:lvl3pPr>
             <a:lvl4pPr marL="1371600" indent="0">
               <a:buNone/>
-              <a:defRPr sz="900"/>
+              <a:defRPr sz="1000"/>
             </a:lvl4pPr>
             <a:lvl5pPr marL="1828800" indent="0">
               <a:buNone/>
-              <a:defRPr sz="900"/>
+              <a:defRPr sz="1000"/>
             </a:lvl5pPr>
             <a:lvl6pPr marL="2286000" indent="0">
               <a:buNone/>
-              <a:defRPr sz="900"/>
+              <a:defRPr sz="1000"/>
             </a:lvl6pPr>
             <a:lvl7pPr marL="2743200" indent="0">
               <a:buNone/>
-              <a:defRPr sz="900"/>
+              <a:defRPr sz="1000"/>
             </a:lvl7pPr>
             <a:lvl8pPr marL="3200400" indent="0">
               <a:buNone/>
-              <a:defRPr sz="900"/>
+              <a:defRPr sz="1000"/>
             </a:lvl8pPr>
             <a:lvl9pPr marL="3657600" indent="0">
               <a:buNone/>
-              <a:defRPr sz="900"/>
+              <a:defRPr sz="1000"/>
             </a:lvl9pPr>
           </a:lstStyle>
           <a:p>
@@ -2697,25 +2339,16 @@
             <p:ph type="dt" sz="half" idx="10"/>
           </p:nvPr>
         </p:nvSpPr>
-        <p:spPr>
-          <a:xfrm>
-            <a:off x="457200" y="6356350"/>
-            <a:ext cx="2133600" cy="365125"/>
-          </a:xfrm>
-          <a:prstGeom prst="rect">
-            <a:avLst/>
-          </a:prstGeom>
-        </p:spPr>
-        <p:txBody>
-          <a:bodyPr/>
-          <a:lstStyle/>
-          <a:p>
-            <a:fld id="{1D8BD707-D9CF-40AE-B4C6-C98DA3205C09}" type="datetimeFigureOut">
-              <a:rPr lang="en-US" smtClean="0"/>
-              <a:pPr/>
-              <a:t>10/1/2013</a:t>
+        <p:spPr/>
+        <p:txBody>
+          <a:bodyPr/>
+          <a:lstStyle/>
+          <a:p>
+            <a:fld id="{58872975-F9EA-4892-8CC1-BA199BA7DB51}" type="datetimeFigureOut">
+              <a:rPr lang="en-GB" smtClean="0"/>
+              <a:t>17/03/2015</a:t>
             </a:fld>
-            <a:endParaRPr lang="en-US"/>
+            <a:endParaRPr lang="en-GB"/>
           </a:p>
         </p:txBody>
       </p:sp>
@@ -2729,20 +2362,12 @@
             <p:ph type="ftr" sz="quarter" idx="11"/>
           </p:nvPr>
         </p:nvSpPr>
-        <p:spPr>
-          <a:xfrm>
-            <a:off x="3124200" y="6356350"/>
-            <a:ext cx="2895600" cy="365125"/>
-          </a:xfrm>
-          <a:prstGeom prst="rect">
-            <a:avLst/>
-          </a:prstGeom>
-        </p:spPr>
-        <p:txBody>
-          <a:bodyPr/>
-          <a:lstStyle/>
-          <a:p>
-            <a:endParaRPr lang="en-US"/>
+        <p:spPr/>
+        <p:txBody>
+          <a:bodyPr/>
+          <a:lstStyle/>
+          <a:p>
+            <a:endParaRPr lang="en-GB"/>
           </a:p>
         </p:txBody>
       </p:sp>
@@ -2761,16 +2386,20 @@
           <a:bodyPr/>
           <a:lstStyle/>
           <a:p>
-            <a:fld id="{B6F15528-21DE-4FAA-801E-634DDDAF4B2B}" type="slidenum">
-              <a:rPr lang="en-US" smtClean="0"/>
-              <a:pPr/>
+            <a:fld id="{9724F7C2-7A76-419E-9588-C9F0D560C6E9}" type="slidenum">
+              <a:rPr lang="en-GB" smtClean="0"/>
               <a:t>‹#›</a:t>
             </a:fld>
-            <a:endParaRPr lang="en-US"/>
+            <a:endParaRPr lang="en-GB"/>
           </a:p>
         </p:txBody>
       </p:sp>
     </p:spTree>
+    <p:extLst>
+      <p:ext uri="{BB962C8B-B14F-4D97-AF65-F5344CB8AC3E}">
+        <p14:creationId xmlns:p14="http://schemas.microsoft.com/office/powerpoint/2010/main" val="2937104705"/>
+      </p:ext>
+    </p:extLst>
   </p:cSld>
   <p:clrMapOvr>
     <a:masterClrMapping/>
@@ -2800,38 +2429,6 @@
           <a:chExt cx="0" cy="0"/>
         </a:xfrm>
       </p:grpSpPr>
-      <p:pic>
-        <p:nvPicPr>
-          <p:cNvPr id="7" name="Picture 7" descr="tech_dist_archive_banner.jpg"/>
-          <p:cNvPicPr>
-            <a:picLocks noChangeAspect="1"/>
-          </p:cNvPicPr>
-          <p:nvPr userDrawn="1"/>
-        </p:nvPicPr>
-        <p:blipFill>
-          <a:blip r:embed="rId13"/>
-          <a:srcRect/>
-          <a:stretch>
-            <a:fillRect/>
-          </a:stretch>
-        </p:blipFill>
-        <p:spPr bwMode="auto">
-          <a:xfrm>
-            <a:off x="0" y="6221413"/>
-            <a:ext cx="9144000" cy="636587"/>
-          </a:xfrm>
-          <a:prstGeom prst="rect">
-            <a:avLst/>
-          </a:prstGeom>
-          <a:noFill/>
-          <a:ln w="9525">
-            <a:noFill/>
-            <a:miter lim="800000"/>
-            <a:headEnd/>
-            <a:tailEnd/>
-          </a:ln>
-        </p:spPr>
-      </p:pic>
       <p:sp>
         <p:nvSpPr>
           <p:cNvPr id="2" name="Title Placeholder 1"/>
@@ -2844,8 +2441,8 @@
         </p:nvSpPr>
         <p:spPr>
           <a:xfrm>
-            <a:off x="457200" y="0"/>
-            <a:ext cx="8229600" cy="1143000"/>
+            <a:off x="838200" y="365125"/>
+            <a:ext cx="10515600" cy="1325563"/>
           </a:xfrm>
           <a:prstGeom prst="rect">
             <a:avLst/>
@@ -2861,7 +2458,7 @@
               <a:rPr lang="en-US" smtClean="0"/>
               <a:t>Click to edit Master title style</a:t>
             </a:r>
-            <a:endParaRPr lang="en-US"/>
+            <a:endParaRPr lang="en-GB"/>
           </a:p>
         </p:txBody>
       </p:sp>
@@ -2877,8 +2474,8 @@
         </p:nvSpPr>
         <p:spPr>
           <a:xfrm>
-            <a:off x="457200" y="1219200"/>
-            <a:ext cx="8229600" cy="4906963"/>
+            <a:off x="838200" y="1825625"/>
+            <a:ext cx="10515600" cy="4351338"/>
           </a:xfrm>
           <a:prstGeom prst="rect">
             <a:avLst/>
@@ -2923,24 +2520,102 @@
               <a:rPr lang="en-US" smtClean="0"/>
               <a:t>Fifth level</a:t>
             </a:r>
-            <a:endParaRPr lang="en-US"/>
-          </a:p>
-        </p:txBody>
-      </p:sp>
-      <p:sp>
-        <p:nvSpPr>
-          <p:cNvPr id="6" name="Slide Number Placeholder 5"/>
-          <p:cNvSpPr>
-            <a:spLocks noGrp="1"/>
-          </p:cNvSpPr>
-          <p:nvPr>
-            <p:ph type="sldNum" sz="quarter" idx="4"/>
+            <a:endParaRPr lang="en-GB"/>
+          </a:p>
+        </p:txBody>
+      </p:sp>
+      <p:sp>
+        <p:nvSpPr>
+          <p:cNvPr id="4" name="Date Placeholder 3"/>
+          <p:cNvSpPr>
+            <a:spLocks noGrp="1"/>
+          </p:cNvSpPr>
+          <p:nvPr>
+            <p:ph type="dt" sz="half" idx="2"/>
           </p:nvPr>
         </p:nvSpPr>
         <p:spPr>
           <a:xfrm>
-            <a:off x="6553200" y="6356350"/>
-            <a:ext cx="2133600" cy="365125"/>
+            <a:off x="838200" y="6356350"/>
+            <a:ext cx="2743200" cy="365125"/>
+          </a:xfrm>
+          <a:prstGeom prst="rect">
+            <a:avLst/>
+          </a:prstGeom>
+        </p:spPr>
+        <p:txBody>
+          <a:bodyPr vert="horz" lIns="91440" tIns="45720" rIns="91440" bIns="45720" rtlCol="0" anchor="ctr"/>
+          <a:lstStyle>
+            <a:lvl1pPr algn="l">
+              <a:defRPr sz="1200">
+                <a:solidFill>
+                  <a:schemeClr val="tx1">
+                    <a:tint val="75000"/>
+                  </a:schemeClr>
+                </a:solidFill>
+              </a:defRPr>
+            </a:lvl1pPr>
+          </a:lstStyle>
+          <a:p>
+            <a:fld id="{58872975-F9EA-4892-8CC1-BA199BA7DB51}" type="datetimeFigureOut">
+              <a:rPr lang="en-GB" smtClean="0"/>
+              <a:t>17/03/2015</a:t>
+            </a:fld>
+            <a:endParaRPr lang="en-GB"/>
+          </a:p>
+        </p:txBody>
+      </p:sp>
+      <p:sp>
+        <p:nvSpPr>
+          <p:cNvPr id="5" name="Footer Placeholder 4"/>
+          <p:cNvSpPr>
+            <a:spLocks noGrp="1"/>
+          </p:cNvSpPr>
+          <p:nvPr>
+            <p:ph type="ftr" sz="quarter" idx="3"/>
+          </p:nvPr>
+        </p:nvSpPr>
+        <p:spPr>
+          <a:xfrm>
+            <a:off x="4038600" y="6356350"/>
+            <a:ext cx="4114800" cy="365125"/>
+          </a:xfrm>
+          <a:prstGeom prst="rect">
+            <a:avLst/>
+          </a:prstGeom>
+        </p:spPr>
+        <p:txBody>
+          <a:bodyPr vert="horz" lIns="91440" tIns="45720" rIns="91440" bIns="45720" rtlCol="0" anchor="ctr"/>
+          <a:lstStyle>
+            <a:lvl1pPr algn="ctr">
+              <a:defRPr sz="1200">
+                <a:solidFill>
+                  <a:schemeClr val="tx1">
+                    <a:tint val="75000"/>
+                  </a:schemeClr>
+                </a:solidFill>
+              </a:defRPr>
+            </a:lvl1pPr>
+          </a:lstStyle>
+          <a:p>
+            <a:endParaRPr lang="en-GB"/>
+          </a:p>
+        </p:txBody>
+      </p:sp>
+      <p:sp>
+        <p:nvSpPr>
+          <p:cNvPr id="6" name="Slide Number Placeholder 5"/>
+          <p:cNvSpPr>
+            <a:spLocks noGrp="1"/>
+          </p:cNvSpPr>
+          <p:nvPr>
+            <p:ph type="sldNum" sz="quarter" idx="4"/>
+          </p:nvPr>
+        </p:nvSpPr>
+        <p:spPr>
+          <a:xfrm>
+            <a:off x="8610600" y="6356350"/>
+            <a:ext cx="2743200" cy="365125"/>
           </a:xfrm>
           <a:prstGeom prst="rect">
             <a:avLst/>
@@ -2960,16 +2635,20 @@
             </a:lvl1pPr>
           </a:lstStyle>
           <a:p>
-            <a:fld id="{B6F15528-21DE-4FAA-801E-634DDDAF4B2B}" type="slidenum">
-              <a:rPr lang="en-US" smtClean="0"/>
-              <a:pPr/>
+            <a:fld id="{9724F7C2-7A76-419E-9588-C9F0D560C6E9}" type="slidenum">
+              <a:rPr lang="en-GB" smtClean="0"/>
               <a:t>‹#›</a:t>
             </a:fld>
-            <a:endParaRPr lang="en-US"/>
+            <a:endParaRPr lang="en-GB"/>
           </a:p>
         </p:txBody>
       </p:sp>
     </p:spTree>
+    <p:extLst>
+      <p:ext uri="{BB962C8B-B14F-4D97-AF65-F5344CB8AC3E}">
+        <p14:creationId xmlns:p14="http://schemas.microsoft.com/office/powerpoint/2010/main" val="3597660104"/>
+      </p:ext>
+    </p:extLst>
   </p:cSld>
   <p:clrMap bg1="lt1" tx1="dk1" bg2="lt2" tx2="dk2" accent1="accent1" accent2="accent2" accent3="accent3" accent4="accent4" accent5="accent5" accent6="accent6" hlink="hlink" folHlink="folHlink"/>
   <p:sldLayoutIdLst>
@@ -2987,12 +2666,15 @@
   </p:sldLayoutIdLst>
   <p:txStyles>
     <p:titleStyle>
-      <a:lvl1pPr algn="ctr" defTabSz="914400" rtl="0" eaLnBrk="1" latinLnBrk="0" hangingPunct="1">
+      <a:lvl1pPr algn="l" defTabSz="914400" rtl="0" eaLnBrk="1" latinLnBrk="0" hangingPunct="1">
+        <a:lnSpc>
+          <a:spcPct val="90000"/>
+        </a:lnSpc>
         <a:spcBef>
           <a:spcPct val="0"/>
         </a:spcBef>
         <a:buNone/>
-        <a:defRPr sz="3600" kern="1200">
+        <a:defRPr sz="4400" kern="1200">
           <a:solidFill>
             <a:schemeClr val="tx1"/>
           </a:solidFill>
@@ -3003,11 +2685,32 @@
       </a:lvl1pPr>
     </p:titleStyle>
     <p:bodyStyle>
-      <a:lvl1pPr marL="342900" indent="-342900" algn="l" defTabSz="914400" rtl="0" eaLnBrk="1" latinLnBrk="0" hangingPunct="1">
+      <a:lvl1pPr marL="228600" indent="-228600" algn="l" defTabSz="914400" rtl="0" eaLnBrk="1" latinLnBrk="0" hangingPunct="1">
+        <a:lnSpc>
+          <a:spcPct val="90000"/>
+        </a:lnSpc>
         <a:spcBef>
-          <a:spcPct val="20000"/>
+          <a:spcPts val="1000"/>
         </a:spcBef>
-        <a:buFont typeface="Arial" pitchFamily="34" charset="0"/>
+        <a:buFont typeface="Arial" panose="020B0604020202020204" pitchFamily="34" charset="0"/>
+        <a:buChar char="•"/>
+        <a:defRPr sz="2800" kern="1200">
+          <a:solidFill>
+            <a:schemeClr val="tx1"/>
+          </a:solidFill>
+          <a:latin typeface="+mn-lt"/>
+          <a:ea typeface="+mn-ea"/>
+          <a:cs typeface="+mn-cs"/>
+        </a:defRPr>
+      </a:lvl1pPr>
+      <a:lvl2pPr marL="685800" indent="-228600" algn="l" defTabSz="914400" rtl="0" eaLnBrk="1" latinLnBrk="0" hangingPunct="1">
+        <a:lnSpc>
+          <a:spcPct val="90000"/>
+        </a:lnSpc>
+        <a:spcBef>
+          <a:spcPts val="500"/>
+        </a:spcBef>
+        <a:buFont typeface="Arial" panose="020B0604020202020204" pitchFamily="34" charset="0"/>
         <a:buChar char="•"/>
         <a:defRPr sz="2400" kern="1200">
           <a:solidFill>
@@ -3017,13 +2720,16 @@
           <a:ea typeface="+mn-ea"/>
           <a:cs typeface="+mn-cs"/>
         </a:defRPr>
-      </a:lvl1pPr>
-      <a:lvl2pPr marL="742950" indent="-285750" algn="l" defTabSz="914400" rtl="0" eaLnBrk="1" latinLnBrk="0" hangingPunct="1">
+      </a:lvl2pPr>
+      <a:lvl3pPr marL="1143000" indent="-228600" algn="l" defTabSz="914400" rtl="0" eaLnBrk="1" latinLnBrk="0" hangingPunct="1">
+        <a:lnSpc>
+          <a:spcPct val="90000"/>
+        </a:lnSpc>
         <a:spcBef>
-          <a:spcPct val="20000"/>
+          <a:spcPts val="500"/>
         </a:spcBef>
-        <a:buFont typeface="Arial" pitchFamily="34" charset="0"/>
-        <a:buChar char="–"/>
+        <a:buFont typeface="Arial" panose="020B0604020202020204" pitchFamily="34" charset="0"/>
+        <a:buChar char="•"/>
         <a:defRPr sz="2000" kern="1200">
           <a:solidFill>
             <a:schemeClr val="tx1"/>
@@ -3032,12 +2738,15 @@
           <a:ea typeface="+mn-ea"/>
           <a:cs typeface="+mn-cs"/>
         </a:defRPr>
-      </a:lvl2pPr>
-      <a:lvl3pPr marL="1143000" indent="-228600" algn="l" defTabSz="914400" rtl="0" eaLnBrk="1" latinLnBrk="0" hangingPunct="1">
+      </a:lvl3pPr>
+      <a:lvl4pPr marL="1600200" indent="-228600" algn="l" defTabSz="914400" rtl="0" eaLnBrk="1" latinLnBrk="0" hangingPunct="1">
+        <a:lnSpc>
+          <a:spcPct val="90000"/>
+        </a:lnSpc>
         <a:spcBef>
-          <a:spcPct val="20000"/>
+          <a:spcPts val="500"/>
         </a:spcBef>
-        <a:buFont typeface="Arial" pitchFamily="34" charset="0"/>
+        <a:buFont typeface="Arial" panose="020B0604020202020204" pitchFamily="34" charset="0"/>
         <a:buChar char="•"/>
         <a:defRPr sz="1800" kern="1200">
           <a:solidFill>
@@ -3047,29 +2756,17 @@
           <a:ea typeface="+mn-ea"/>
           <a:cs typeface="+mn-cs"/>
         </a:defRPr>
-      </a:lvl3pPr>
-      <a:lvl4pPr marL="1600200" indent="-228600" algn="l" defTabSz="914400" rtl="0" eaLnBrk="1" latinLnBrk="0" hangingPunct="1">
-        <a:spcBef>
-          <a:spcPct val="20000"/>
-        </a:spcBef>
-        <a:buFont typeface="Arial" pitchFamily="34" charset="0"/>
-        <a:buChar char="–"/>
-        <a:defRPr sz="1600" kern="1200">
-          <a:solidFill>
-            <a:schemeClr val="tx1"/>
-          </a:solidFill>
-          <a:latin typeface="+mn-lt"/>
-          <a:ea typeface="+mn-ea"/>
-          <a:cs typeface="+mn-cs"/>
-        </a:defRPr>
       </a:lvl4pPr>
       <a:lvl5pPr marL="2057400" indent="-228600" algn="l" defTabSz="914400" rtl="0" eaLnBrk="1" latinLnBrk="0" hangingPunct="1">
+        <a:lnSpc>
+          <a:spcPct val="90000"/>
+        </a:lnSpc>
         <a:spcBef>
-          <a:spcPct val="20000"/>
+          <a:spcPts val="500"/>
         </a:spcBef>
-        <a:buFont typeface="Arial" pitchFamily="34" charset="0"/>
-        <a:buChar char="»"/>
-        <a:defRPr sz="1600" kern="1200">
+        <a:buFont typeface="Arial" panose="020B0604020202020204" pitchFamily="34" charset="0"/>
+        <a:buChar char="•"/>
+        <a:defRPr sz="1800" kern="1200">
           <a:solidFill>
             <a:schemeClr val="tx1"/>
           </a:solidFill>
@@ -3079,12 +2776,15 @@
         </a:defRPr>
       </a:lvl5pPr>
       <a:lvl6pPr marL="2514600" indent="-228600" algn="l" defTabSz="914400" rtl="0" eaLnBrk="1" latinLnBrk="0" hangingPunct="1">
+        <a:lnSpc>
+          <a:spcPct val="90000"/>
+        </a:lnSpc>
         <a:spcBef>
-          <a:spcPct val="20000"/>
+          <a:spcPts val="500"/>
         </a:spcBef>
-        <a:buFont typeface="Arial" pitchFamily="34" charset="0"/>
+        <a:buFont typeface="Arial" panose="020B0604020202020204" pitchFamily="34" charset="0"/>
         <a:buChar char="•"/>
-        <a:defRPr sz="2000" kern="1200">
+        <a:defRPr sz="1800" kern="1200">
           <a:solidFill>
             <a:schemeClr val="tx1"/>
           </a:solidFill>
@@ -3094,12 +2794,15 @@
         </a:defRPr>
       </a:lvl6pPr>
       <a:lvl7pPr marL="2971800" indent="-228600" algn="l" defTabSz="914400" rtl="0" eaLnBrk="1" latinLnBrk="0" hangingPunct="1">
+        <a:lnSpc>
+          <a:spcPct val="90000"/>
+        </a:lnSpc>
         <a:spcBef>
-          <a:spcPct val="20000"/>
+          <a:spcPts val="500"/>
         </a:spcBef>
-        <a:buFont typeface="Arial" pitchFamily="34" charset="0"/>
+        <a:buFont typeface="Arial" panose="020B0604020202020204" pitchFamily="34" charset="0"/>
         <a:buChar char="•"/>
-        <a:defRPr sz="2000" kern="1200">
+        <a:defRPr sz="1800" kern="1200">
           <a:solidFill>
             <a:schemeClr val="tx1"/>
           </a:solidFill>
@@ -3109,12 +2812,15 @@
         </a:defRPr>
       </a:lvl7pPr>
       <a:lvl8pPr marL="3429000" indent="-228600" algn="l" defTabSz="914400" rtl="0" eaLnBrk="1" latinLnBrk="0" hangingPunct="1">
+        <a:lnSpc>
+          <a:spcPct val="90000"/>
+        </a:lnSpc>
         <a:spcBef>
-          <a:spcPct val="20000"/>
+          <a:spcPts val="500"/>
         </a:spcBef>
-        <a:buFont typeface="Arial" pitchFamily="34" charset="0"/>
+        <a:buFont typeface="Arial" panose="020B0604020202020204" pitchFamily="34" charset="0"/>
         <a:buChar char="•"/>
-        <a:defRPr sz="2000" kern="1200">
+        <a:defRPr sz="1800" kern="1200">
           <a:solidFill>
             <a:schemeClr val="tx1"/>
           </a:solidFill>
@@ -3124,12 +2830,15 @@
         </a:defRPr>
       </a:lvl8pPr>
       <a:lvl9pPr marL="3886200" indent="-228600" algn="l" defTabSz="914400" rtl="0" eaLnBrk="1" latinLnBrk="0" hangingPunct="1">
+        <a:lnSpc>
+          <a:spcPct val="90000"/>
+        </a:lnSpc>
         <a:spcBef>
-          <a:spcPct val="20000"/>
+          <a:spcPts val="500"/>
         </a:spcBef>
-        <a:buFont typeface="Arial" pitchFamily="34" charset="0"/>
+        <a:buFont typeface="Arial" panose="020B0604020202020204" pitchFamily="34" charset="0"/>
         <a:buChar char="•"/>
-        <a:defRPr sz="2000" kern="1200">
+        <a:defRPr sz="1800" kern="1200">
           <a:solidFill>
             <a:schemeClr val="tx1"/>
           </a:solidFill>
@@ -3255,859 +2964,48 @@
           <a:chExt cx="0" cy="0"/>
         </a:xfrm>
       </p:grpSpPr>
-      <p:grpSp>
-        <p:nvGrpSpPr>
-          <p:cNvPr id="13" name="Group 12"/>
-          <p:cNvGrpSpPr/>
-          <p:nvPr/>
-        </p:nvGrpSpPr>
-        <p:grpSpPr>
-          <a:xfrm>
-            <a:off x="1632809" y="1058822"/>
-            <a:ext cx="5878382" cy="4427580"/>
-            <a:chOff x="2057400" y="1211220"/>
-            <a:chExt cx="5878382" cy="4427580"/>
-          </a:xfrm>
-        </p:grpSpPr>
-        <p:sp>
-          <p:nvSpPr>
-            <p:cNvPr id="8" name="Rectangle 7"/>
-            <p:cNvSpPr/>
-            <p:nvPr/>
-          </p:nvSpPr>
-          <p:spPr>
-            <a:xfrm>
-              <a:off x="2057400" y="3425010"/>
-              <a:ext cx="2939191" cy="2213790"/>
-            </a:xfrm>
-            <a:prstGeom prst="rect">
-              <a:avLst/>
-            </a:prstGeom>
-            <a:solidFill>
-              <a:srgbClr val="FFFF99"/>
-            </a:solidFill>
-            <a:ln>
-              <a:noFill/>
-            </a:ln>
-          </p:spPr>
-          <p:style>
-            <a:lnRef idx="2">
-              <a:schemeClr val="accent1">
-                <a:shade val="50000"/>
-              </a:schemeClr>
-            </a:lnRef>
-            <a:fillRef idx="1">
-              <a:schemeClr val="accent1"/>
-            </a:fillRef>
-            <a:effectRef idx="0">
-              <a:schemeClr val="accent1"/>
-            </a:effectRef>
-            <a:fontRef idx="minor">
-              <a:schemeClr val="lt1"/>
-            </a:fontRef>
-          </p:style>
-          <p:txBody>
-            <a:bodyPr rtlCol="0" anchor="t"/>
-            <a:lstStyle/>
-            <a:p>
-              <a:pPr marL="9525" lvl="0">
-                <a:spcAft>
-                  <a:spcPts val="600"/>
-                </a:spcAft>
-              </a:pPr>
-              <a:r>
-                <a:rPr lang="en-GB" sz="1200" b="1" i="1" u="sng" dirty="0">
-                  <a:solidFill>
-                    <a:srgbClr val="000000"/>
-                  </a:solidFill>
-                </a:rPr>
-                <a:t>Diverse</a:t>
-              </a:r>
-            </a:p>
-            <a:p>
-              <a:pPr marL="85725" lvl="1" indent="-77788">
-                <a:buFont typeface="Arial" pitchFamily="34" charset="0"/>
-                <a:buChar char="•"/>
-              </a:pPr>
-              <a:r>
-                <a:rPr lang="en-GB" sz="1100" i="1" dirty="0">
-                  <a:solidFill>
-                    <a:srgbClr val="000000"/>
-                  </a:solidFill>
-                </a:rPr>
-                <a:t>Autonomous business management</a:t>
-              </a:r>
-            </a:p>
-            <a:p>
-              <a:pPr marL="85725" lvl="1" indent="-77788">
-                <a:buFont typeface="Arial" pitchFamily="34" charset="0"/>
-                <a:buChar char="•"/>
-              </a:pPr>
-              <a:r>
-                <a:rPr lang="en-GB" sz="1100" i="1" dirty="0">
-                  <a:solidFill>
-                    <a:srgbClr val="000000"/>
-                  </a:solidFill>
-                </a:rPr>
-                <a:t>Independent transactions</a:t>
-              </a:r>
-            </a:p>
-            <a:p>
-              <a:pPr marL="85725" lvl="1" indent="-77788">
-                <a:buFont typeface="Arial" pitchFamily="34" charset="0"/>
-                <a:buChar char="•"/>
-              </a:pPr>
-              <a:r>
-                <a:rPr lang="en-GB" sz="1100" i="1" dirty="0">
-                  <a:solidFill>
-                    <a:srgbClr val="000000"/>
-                  </a:solidFill>
-                </a:rPr>
-                <a:t>Few data standards across business units</a:t>
-              </a:r>
-            </a:p>
-            <a:p>
-              <a:pPr marL="85725" lvl="1" indent="-77788">
-                <a:buFont typeface="Arial" pitchFamily="34" charset="0"/>
-                <a:buChar char="•"/>
-              </a:pPr>
-              <a:r>
-                <a:rPr lang="en-GB" sz="1100" i="1" dirty="0">
-                  <a:solidFill>
-                    <a:srgbClr val="000000"/>
-                  </a:solidFill>
-                </a:rPr>
-                <a:t>Most technology decisions made within business units  providing limited </a:t>
-              </a:r>
-              <a:r>
-                <a:rPr lang="en-GB" sz="1100" i="1" dirty="0" smtClean="0">
-                  <a:solidFill>
-                    <a:srgbClr val="000000"/>
-                  </a:solidFill>
-                </a:rPr>
-                <a:t>interoperability</a:t>
-              </a:r>
-              <a:endParaRPr lang="en-GB" sz="1100" i="1" dirty="0">
-                <a:solidFill>
-                  <a:srgbClr val="000000"/>
-                </a:solidFill>
-              </a:endParaRPr>
-            </a:p>
-          </p:txBody>
-        </p:sp>
-        <p:sp>
-          <p:nvSpPr>
-            <p:cNvPr id="10" name="Rectangle 9"/>
-            <p:cNvSpPr/>
-            <p:nvPr/>
-          </p:nvSpPr>
-          <p:spPr>
-            <a:xfrm>
-              <a:off x="4996591" y="3425010"/>
-              <a:ext cx="2939191" cy="2213790"/>
-            </a:xfrm>
-            <a:prstGeom prst="rect">
-              <a:avLst/>
-            </a:prstGeom>
-            <a:solidFill>
-              <a:srgbClr val="47DDA7"/>
-            </a:solidFill>
-            <a:ln>
-              <a:noFill/>
-            </a:ln>
-          </p:spPr>
-          <p:style>
-            <a:lnRef idx="2">
-              <a:schemeClr val="accent1">
-                <a:shade val="50000"/>
-              </a:schemeClr>
-            </a:lnRef>
-            <a:fillRef idx="1">
-              <a:schemeClr val="accent1"/>
-            </a:fillRef>
-            <a:effectRef idx="0">
-              <a:schemeClr val="accent1"/>
-            </a:effectRef>
-            <a:fontRef idx="minor">
-              <a:schemeClr val="lt1"/>
-            </a:fontRef>
-          </p:style>
-          <p:txBody>
-            <a:bodyPr rtlCol="0" anchor="t"/>
-            <a:lstStyle/>
-            <a:p>
-              <a:pPr lvl="0">
-                <a:spcAft>
-                  <a:spcPts val="600"/>
-                </a:spcAft>
-              </a:pPr>
-              <a:r>
-                <a:rPr lang="en-GB" sz="1200" b="1" i="1" u="sng" dirty="0">
-                  <a:solidFill>
-                    <a:srgbClr val="000000"/>
-                  </a:solidFill>
-                </a:rPr>
-                <a:t>Replicated</a:t>
-              </a:r>
-            </a:p>
-            <a:p>
-              <a:pPr marL="87313" lvl="0" indent="-87313">
-                <a:buFont typeface="Arial" pitchFamily="34" charset="0"/>
-                <a:buChar char="•"/>
-              </a:pPr>
-              <a:r>
-                <a:rPr lang="en-GB" sz="1100" i="1" dirty="0">
-                  <a:solidFill>
-                    <a:srgbClr val="000000"/>
-                  </a:solidFill>
-                </a:rPr>
-                <a:t>Autonomous business unit leaders  with some limited discretion over workflows – central control over workflow design. </a:t>
-              </a:r>
-            </a:p>
-            <a:p>
-              <a:pPr marL="87313" lvl="0" indent="-87313">
-                <a:buFont typeface="Arial" pitchFamily="34" charset="0"/>
-                <a:buChar char="•"/>
-              </a:pPr>
-              <a:r>
-                <a:rPr lang="en-GB" sz="1100" i="1" dirty="0">
-                  <a:solidFill>
-                    <a:srgbClr val="000000"/>
-                  </a:solidFill>
-                </a:rPr>
-                <a:t>Standard technology eco-systems  implemented across the BBC capable of supporting domain workflows.</a:t>
-              </a:r>
-            </a:p>
-            <a:p>
-              <a:pPr marL="87313" lvl="0" indent="-87313">
-                <a:buFont typeface="Arial" pitchFamily="34" charset="0"/>
-                <a:buChar char="•"/>
-              </a:pPr>
-              <a:r>
-                <a:rPr lang="en-GB" sz="1100" i="1" dirty="0">
-                  <a:solidFill>
-                    <a:srgbClr val="000000"/>
-                  </a:solidFill>
-                </a:rPr>
-                <a:t>Pan-BBC standards for outputs, deliverables, interfaces and codecs.</a:t>
-              </a:r>
-            </a:p>
-            <a:p>
-              <a:pPr marL="87313" lvl="0" indent="-87313">
-                <a:buFont typeface="Arial" pitchFamily="34" charset="0"/>
-                <a:buChar char="•"/>
-              </a:pPr>
-              <a:r>
-                <a:rPr lang="en-GB" sz="1100" i="1" dirty="0">
-                  <a:solidFill>
-                    <a:srgbClr val="000000"/>
-                  </a:solidFill>
-                </a:rPr>
-                <a:t>Data held locally with some pan BBC aggregation</a:t>
-              </a:r>
-              <a:r>
-                <a:rPr lang="en-GB" sz="1100" i="1" dirty="0" smtClean="0">
-                  <a:solidFill>
-                    <a:srgbClr val="000000"/>
-                  </a:solidFill>
-                </a:rPr>
-                <a:t>.</a:t>
-              </a:r>
-              <a:endParaRPr lang="en-GB" sz="1100" i="1" dirty="0">
-                <a:solidFill>
-                  <a:srgbClr val="000000"/>
-                </a:solidFill>
-              </a:endParaRPr>
-            </a:p>
-          </p:txBody>
-        </p:sp>
-        <p:sp>
-          <p:nvSpPr>
-            <p:cNvPr id="11" name="Rectangle 10"/>
-            <p:cNvSpPr/>
-            <p:nvPr/>
-          </p:nvSpPr>
-          <p:spPr>
-            <a:xfrm>
-              <a:off x="2057400" y="1211220"/>
-              <a:ext cx="2939191" cy="2213790"/>
-            </a:xfrm>
-            <a:prstGeom prst="rect">
-              <a:avLst/>
-            </a:prstGeom>
-            <a:solidFill>
-              <a:srgbClr val="FF9900"/>
-            </a:solidFill>
-            <a:ln>
-              <a:noFill/>
-            </a:ln>
-          </p:spPr>
-          <p:style>
-            <a:lnRef idx="2">
-              <a:schemeClr val="accent1">
-                <a:shade val="50000"/>
-              </a:schemeClr>
-            </a:lnRef>
-            <a:fillRef idx="1">
-              <a:schemeClr val="accent1"/>
-            </a:fillRef>
-            <a:effectRef idx="0">
-              <a:schemeClr val="accent1"/>
-            </a:effectRef>
-            <a:fontRef idx="minor">
-              <a:schemeClr val="lt1"/>
-            </a:fontRef>
-          </p:style>
-          <p:txBody>
-            <a:bodyPr rtlCol="0" anchor="t"/>
-            <a:lstStyle/>
-            <a:p>
-              <a:pPr lvl="0">
-                <a:spcAft>
-                  <a:spcPts val="600"/>
-                </a:spcAft>
-              </a:pPr>
-              <a:r>
-                <a:rPr lang="en-GB" sz="1200" b="1" i="1" u="sng" dirty="0">
-                  <a:solidFill>
-                    <a:srgbClr val="000000"/>
-                  </a:solidFill>
-                </a:rPr>
-                <a:t>Coordinated</a:t>
-              </a:r>
-            </a:p>
-            <a:p>
-              <a:pPr marL="87313" lvl="0" indent="-87313">
-                <a:buFont typeface="Arial" pitchFamily="34" charset="0"/>
-                <a:buChar char="•"/>
-              </a:pPr>
-              <a:r>
-                <a:rPr lang="en-GB" sz="1100" i="1" dirty="0">
-                  <a:solidFill>
-                    <a:srgbClr val="000000"/>
-                  </a:solidFill>
-                </a:rPr>
-                <a:t>Operationally unique business units or functions - local standards deployed for workflows.</a:t>
-              </a:r>
-            </a:p>
-            <a:p>
-              <a:pPr marL="87313" lvl="0" indent="-87313">
-                <a:buFont typeface="Arial" pitchFamily="34" charset="0"/>
-                <a:buChar char="•"/>
-              </a:pPr>
-              <a:r>
-                <a:rPr lang="en-GB" sz="1100" i="1" dirty="0">
-                  <a:solidFill>
-                    <a:srgbClr val="000000"/>
-                  </a:solidFill>
-                </a:rPr>
-                <a:t>Different systems where required, but integrated through pan-BBC standards for outputs, deliverables, interfaces and codecs.</a:t>
-              </a:r>
-            </a:p>
-            <a:p>
-              <a:pPr marL="87313" lvl="0" indent="-87313">
-                <a:buFont typeface="Arial" pitchFamily="34" charset="0"/>
-                <a:buChar char="•"/>
-              </a:pPr>
-              <a:r>
-                <a:rPr lang="en-GB" sz="1100" i="1" dirty="0">
-                  <a:solidFill>
-                    <a:srgbClr val="000000"/>
-                  </a:solidFill>
-                </a:rPr>
-                <a:t>Technology infrastructure implemented across the BBC capable of supporting different workflows.</a:t>
-              </a:r>
-              <a:endParaRPr lang="en-GB" sz="1100" i="1" dirty="0">
-                <a:solidFill>
-                  <a:srgbClr val="000000"/>
-                </a:solidFill>
-              </a:endParaRPr>
-            </a:p>
-          </p:txBody>
-        </p:sp>
-        <p:sp>
-          <p:nvSpPr>
-            <p:cNvPr id="12" name="Rectangle 11"/>
-            <p:cNvSpPr/>
-            <p:nvPr/>
-          </p:nvSpPr>
-          <p:spPr>
-            <a:xfrm>
-              <a:off x="4996591" y="1211220"/>
-              <a:ext cx="2939191" cy="2213790"/>
-            </a:xfrm>
-            <a:prstGeom prst="rect">
-              <a:avLst/>
-            </a:prstGeom>
-            <a:solidFill>
-              <a:srgbClr val="6666FF"/>
-            </a:solidFill>
-            <a:ln>
-              <a:noFill/>
-            </a:ln>
-          </p:spPr>
-          <p:style>
-            <a:lnRef idx="2">
-              <a:schemeClr val="accent1">
-                <a:shade val="50000"/>
-              </a:schemeClr>
-            </a:lnRef>
-            <a:fillRef idx="1">
-              <a:schemeClr val="accent1"/>
-            </a:fillRef>
-            <a:effectRef idx="0">
-              <a:schemeClr val="accent1"/>
-            </a:effectRef>
-            <a:fontRef idx="minor">
-              <a:schemeClr val="lt1"/>
-            </a:fontRef>
-          </p:style>
-          <p:txBody>
-            <a:bodyPr rtlCol="0" anchor="t"/>
-            <a:lstStyle/>
-            <a:p>
-              <a:pPr lvl="0">
-                <a:spcAft>
-                  <a:spcPts val="600"/>
-                </a:spcAft>
-              </a:pPr>
-              <a:r>
-                <a:rPr lang="en-GB" sz="1200" b="1" i="1" u="sng" dirty="0">
-                  <a:solidFill>
-                    <a:prstClr val="black"/>
-                  </a:solidFill>
-                </a:rPr>
-                <a:t>Unified</a:t>
-              </a:r>
-            </a:p>
-            <a:p>
-              <a:pPr marL="87313" lvl="0" indent="-87313">
-                <a:buFont typeface="Arial" pitchFamily="34" charset="0"/>
-                <a:buChar char="•"/>
-              </a:pPr>
-              <a:r>
-                <a:rPr lang="en-GB" sz="1100" i="1" dirty="0">
-                  <a:solidFill>
-                    <a:prstClr val="black"/>
-                  </a:solidFill>
-                </a:rPr>
-                <a:t>Business units with similar or overlapping operations.- high level process owners define standard integrated workflows and information needs. </a:t>
-              </a:r>
-            </a:p>
-            <a:p>
-              <a:pPr marL="87313" lvl="0" indent="-87313">
-                <a:buFont typeface="Arial" pitchFamily="34" charset="0"/>
-                <a:buChar char="•"/>
-              </a:pPr>
-              <a:r>
-                <a:rPr lang="en-GB" sz="1100" i="1" dirty="0">
-                  <a:solidFill>
-                    <a:prstClr val="black"/>
-                  </a:solidFill>
-                </a:rPr>
-                <a:t>Standard technology ecosystems implemented across the BBC that do not differ  from, for example, genre or geography.</a:t>
-              </a:r>
-            </a:p>
-            <a:p>
-              <a:pPr marL="87313" lvl="0" indent="-87313">
-                <a:buFont typeface="Arial" pitchFamily="34" charset="0"/>
-                <a:buChar char="•"/>
-              </a:pPr>
-              <a:r>
-                <a:rPr lang="en-GB" sz="1100" i="1" dirty="0">
-                  <a:solidFill>
-                    <a:prstClr val="black"/>
-                  </a:solidFill>
-                </a:rPr>
-                <a:t>Pan-BBC standards for outputs, deliverables, interfaces and codecs</a:t>
-              </a:r>
-              <a:r>
-                <a:rPr lang="en-GB" sz="1100" i="1" dirty="0" smtClean="0">
-                  <a:solidFill>
-                    <a:prstClr val="black"/>
-                  </a:solidFill>
-                </a:rPr>
-                <a:t>.</a:t>
-              </a:r>
-              <a:endParaRPr lang="en-GB" sz="1100" i="1" dirty="0">
-                <a:solidFill>
-                  <a:prstClr val="black"/>
-                </a:solidFill>
-              </a:endParaRPr>
-            </a:p>
-          </p:txBody>
-        </p:sp>
-      </p:grpSp>
-      <p:sp>
-        <p:nvSpPr>
-          <p:cNvPr id="16" name="Title 15"/>
-          <p:cNvSpPr>
-            <a:spLocks noGrp="1"/>
-          </p:cNvSpPr>
-          <p:nvPr>
-            <p:ph type="title"/>
-          </p:nvPr>
-        </p:nvSpPr>
-        <p:spPr>
-          <a:prstGeom prst="rect">
-            <a:avLst/>
-          </a:prstGeom>
-        </p:spPr>
-        <p:txBody>
-          <a:bodyPr wrap="none">
-            <a:spAutoFit/>
-          </a:bodyPr>
-          <a:lstStyle/>
-          <a:p>
-            <a:r>
-              <a:rPr lang="en-GB" dirty="0"/>
-              <a:t>Standardisation &amp; Flexibility</a:t>
-            </a:r>
-          </a:p>
-        </p:txBody>
-      </p:sp>
-      <p:grpSp>
-        <p:nvGrpSpPr>
-          <p:cNvPr id="17" name="Group 16"/>
-          <p:cNvGrpSpPr/>
-          <p:nvPr/>
-        </p:nvGrpSpPr>
-        <p:grpSpPr>
-          <a:xfrm flipV="1">
-            <a:off x="1295400" y="5514208"/>
-            <a:ext cx="6215791" cy="657993"/>
-            <a:chOff x="2864768" y="5624264"/>
-            <a:chExt cx="4536504" cy="581510"/>
-          </a:xfrm>
-        </p:grpSpPr>
-        <p:cxnSp>
-          <p:nvCxnSpPr>
-            <p:cNvPr id="18" name="Straight Arrow Connector 17"/>
-            <p:cNvCxnSpPr/>
-            <p:nvPr/>
-          </p:nvCxnSpPr>
-          <p:spPr bwMode="auto">
-            <a:xfrm>
-              <a:off x="2864768" y="5949280"/>
-              <a:ext cx="4536504" cy="0"/>
-            </a:xfrm>
-            <a:prstGeom prst="straightConnector1">
-              <a:avLst/>
-            </a:prstGeom>
-            <a:solidFill>
-              <a:schemeClr val="accent1"/>
-            </a:solidFill>
-            <a:ln w="38100" cap="flat" cmpd="sng" algn="ctr">
-              <a:solidFill>
-                <a:schemeClr val="tx1"/>
-              </a:solidFill>
-              <a:prstDash val="solid"/>
-              <a:round/>
-              <a:headEnd type="none" w="med" len="med"/>
-              <a:tailEnd type="arrow"/>
-            </a:ln>
-            <a:effectLst/>
-            <a:extLst>
-              <a:ext uri="{AF507438-7753-43E0-B8FC-AC1667EBCBE1}">
-                <a14:hiddenEffects xmlns:a14="http://schemas.microsoft.com/office/drawing/2010/main">
-                  <a:effectLst>
-                    <a:outerShdw dist="35921" dir="2700000" algn="ctr" rotWithShape="0">
-                      <a:schemeClr val="bg2"/>
-                    </a:outerShdw>
-                  </a:effectLst>
-                </a14:hiddenEffects>
-              </a:ext>
-            </a:extLst>
-          </p:spPr>
-        </p:cxnSp>
-        <p:sp>
-          <p:nvSpPr>
-            <p:cNvPr id="19" name="TextBox 18"/>
-            <p:cNvSpPr txBox="1"/>
-            <p:nvPr/>
-          </p:nvSpPr>
-          <p:spPr>
-            <a:xfrm flipV="1">
-              <a:off x="2864768" y="5624264"/>
-              <a:ext cx="4536504" cy="299202"/>
-            </a:xfrm>
-            <a:prstGeom prst="rect">
-              <a:avLst/>
-            </a:prstGeom>
-            <a:noFill/>
-          </p:spPr>
-          <p:txBody>
-            <a:bodyPr wrap="square" rtlCol="0">
-              <a:spAutoFit/>
-            </a:bodyPr>
-            <a:lstStyle/>
-            <a:p>
-              <a:pPr algn="ctr"/>
-              <a:r>
-                <a:rPr lang="en-GB" sz="1600" b="1" dirty="0" smtClean="0">
-                  <a:solidFill>
-                    <a:srgbClr val="000000"/>
-                  </a:solidFill>
-                </a:rPr>
-                <a:t>Business Process Standardisation</a:t>
-              </a:r>
-              <a:endParaRPr lang="en-GB" sz="1600" b="1" dirty="0">
-                <a:solidFill>
-                  <a:srgbClr val="000000"/>
-                </a:solidFill>
-              </a:endParaRPr>
-            </a:p>
-          </p:txBody>
-        </p:sp>
-        <p:sp>
-          <p:nvSpPr>
-            <p:cNvPr id="20" name="TextBox 19"/>
-            <p:cNvSpPr txBox="1"/>
-            <p:nvPr/>
-          </p:nvSpPr>
-          <p:spPr>
-            <a:xfrm flipV="1">
-              <a:off x="2864768" y="5960972"/>
-              <a:ext cx="4536504" cy="244802"/>
-            </a:xfrm>
-            <a:prstGeom prst="rect">
-              <a:avLst/>
-            </a:prstGeom>
-            <a:noFill/>
-          </p:spPr>
-          <p:txBody>
-            <a:bodyPr wrap="square" rtlCol="0">
-              <a:spAutoFit/>
-            </a:bodyPr>
-            <a:lstStyle/>
-            <a:p>
-              <a:pPr algn="ctr"/>
-              <a:r>
-                <a:rPr lang="en-GB" sz="1200" b="1" dirty="0" smtClean="0">
-                  <a:solidFill>
-                    <a:schemeClr val="bg2">
-                      <a:lumMod val="50000"/>
-                    </a:schemeClr>
-                  </a:solidFill>
-                </a:rPr>
-                <a:t>Re-use </a:t>
-              </a:r>
-              <a:r>
-                <a:rPr lang="en-GB" sz="1200" b="1" dirty="0" smtClean="0">
-                  <a:solidFill>
-                    <a:schemeClr val="bg2">
-                      <a:lumMod val="50000"/>
-                    </a:schemeClr>
-                  </a:solidFill>
-                </a:rPr>
-                <a:t>processes </a:t>
-              </a:r>
-              <a:r>
-                <a:rPr lang="en-GB" sz="1200" b="1" dirty="0">
-                  <a:solidFill>
-                    <a:schemeClr val="bg2">
-                      <a:lumMod val="50000"/>
-                    </a:schemeClr>
-                  </a:solidFill>
-                </a:rPr>
-                <a:t>&amp;</a:t>
-              </a:r>
-              <a:r>
-                <a:rPr lang="en-GB" sz="1200" b="1" dirty="0" smtClean="0">
-                  <a:solidFill>
-                    <a:schemeClr val="bg2">
-                      <a:lumMod val="50000"/>
-                    </a:schemeClr>
-                  </a:solidFill>
-                </a:rPr>
-                <a:t> applications</a:t>
-              </a:r>
-              <a:endParaRPr lang="en-GB" sz="1200" b="1" dirty="0">
-                <a:solidFill>
-                  <a:schemeClr val="bg2">
-                    <a:lumMod val="50000"/>
-                  </a:schemeClr>
-                </a:solidFill>
-              </a:endParaRPr>
-            </a:p>
-          </p:txBody>
-        </p:sp>
-      </p:grpSp>
-      <p:grpSp>
-        <p:nvGrpSpPr>
-          <p:cNvPr id="21" name="Group 20"/>
-          <p:cNvGrpSpPr/>
-          <p:nvPr/>
-        </p:nvGrpSpPr>
-        <p:grpSpPr>
-          <a:xfrm rot="16200000">
-            <a:off x="-1317631" y="3050173"/>
-            <a:ext cx="5219711" cy="643365"/>
-            <a:chOff x="2671442" y="5669608"/>
-            <a:chExt cx="5036877" cy="524399"/>
-          </a:xfrm>
-        </p:grpSpPr>
-        <p:cxnSp>
-          <p:nvCxnSpPr>
-            <p:cNvPr id="22" name="Straight Arrow Connector 21"/>
-            <p:cNvCxnSpPr/>
-            <p:nvPr/>
-          </p:nvCxnSpPr>
-          <p:spPr bwMode="auto">
-            <a:xfrm>
-              <a:off x="2864768" y="5949280"/>
-              <a:ext cx="4536504" cy="0"/>
-            </a:xfrm>
-            <a:prstGeom prst="straightConnector1">
-              <a:avLst/>
-            </a:prstGeom>
-            <a:solidFill>
-              <a:schemeClr val="accent1"/>
-            </a:solidFill>
-            <a:ln w="38100" cap="flat" cmpd="sng" algn="ctr">
-              <a:solidFill>
-                <a:schemeClr val="tx1"/>
-              </a:solidFill>
-              <a:prstDash val="solid"/>
-              <a:round/>
-              <a:headEnd type="none" w="med" len="med"/>
-              <a:tailEnd type="arrow"/>
-            </a:ln>
-            <a:effectLst/>
-            <a:extLst>
-              <a:ext uri="{AF507438-7753-43E0-B8FC-AC1667EBCBE1}">
-                <a14:hiddenEffects xmlns:a14="http://schemas.microsoft.com/office/drawing/2010/main">
-                  <a:effectLst>
-                    <a:outerShdw dist="35921" dir="2700000" algn="ctr" rotWithShape="0">
-                      <a:schemeClr val="bg2"/>
-                    </a:outerShdw>
-                  </a:effectLst>
-                </a14:hiddenEffects>
-              </a:ext>
-            </a:extLst>
-          </p:spPr>
-        </p:cxnSp>
-        <p:sp>
-          <p:nvSpPr>
-            <p:cNvPr id="23" name="TextBox 22"/>
-            <p:cNvSpPr txBox="1"/>
-            <p:nvPr/>
-          </p:nvSpPr>
-          <p:spPr>
-            <a:xfrm>
-              <a:off x="2671442" y="5669608"/>
-              <a:ext cx="5007444" cy="275952"/>
-            </a:xfrm>
-            <a:prstGeom prst="rect">
-              <a:avLst/>
-            </a:prstGeom>
-            <a:noFill/>
-          </p:spPr>
-          <p:txBody>
-            <a:bodyPr wrap="square" rtlCol="0">
-              <a:spAutoFit/>
-            </a:bodyPr>
-            <a:lstStyle/>
-            <a:p>
-              <a:pPr algn="ctr"/>
-              <a:r>
-                <a:rPr lang="en-GB" sz="1600" b="1" dirty="0" smtClean="0">
-                  <a:solidFill>
-                    <a:srgbClr val="000000"/>
-                  </a:solidFill>
-                </a:rPr>
-                <a:t>Business Process </a:t>
-              </a:r>
-              <a:r>
-                <a:rPr lang="en-GB" sz="1600" b="1" dirty="0" smtClean="0">
-                  <a:solidFill>
-                    <a:srgbClr val="000000"/>
-                  </a:solidFill>
-                </a:rPr>
-                <a:t>and</a:t>
-              </a:r>
-              <a:r>
-                <a:rPr lang="en-GB" sz="1600" b="1" dirty="0" smtClean="0">
-                  <a:solidFill>
-                    <a:srgbClr val="000000"/>
-                  </a:solidFill>
-                </a:rPr>
-                <a:t> Data </a:t>
-              </a:r>
-              <a:r>
-                <a:rPr lang="en-GB" sz="1600" b="1" dirty="0" smtClean="0">
-                  <a:solidFill>
-                    <a:srgbClr val="000000"/>
-                  </a:solidFill>
-                </a:rPr>
-                <a:t>Integration</a:t>
-              </a:r>
-              <a:endParaRPr lang="en-GB" sz="1600" b="1" dirty="0">
-                <a:solidFill>
-                  <a:srgbClr val="000000"/>
-                </a:solidFill>
-              </a:endParaRPr>
-            </a:p>
-          </p:txBody>
-        </p:sp>
-        <p:sp>
-          <p:nvSpPr>
-            <p:cNvPr id="24" name="TextBox 23"/>
-            <p:cNvSpPr txBox="1"/>
-            <p:nvPr/>
-          </p:nvSpPr>
-          <p:spPr>
-            <a:xfrm>
-              <a:off x="2671442" y="5968228"/>
-              <a:ext cx="5036877" cy="225779"/>
-            </a:xfrm>
-            <a:prstGeom prst="rect">
-              <a:avLst/>
-            </a:prstGeom>
-            <a:noFill/>
-          </p:spPr>
-          <p:txBody>
-            <a:bodyPr wrap="square" rtlCol="0">
-              <a:spAutoFit/>
-            </a:bodyPr>
-            <a:lstStyle/>
-            <a:p>
-              <a:pPr algn="ctr"/>
-              <a:r>
-                <a:rPr lang="en-GB" sz="1200" b="1" dirty="0" smtClean="0">
-                  <a:solidFill>
-                    <a:schemeClr val="bg2">
-                      <a:lumMod val="50000"/>
-                    </a:schemeClr>
-                  </a:solidFill>
-                </a:rPr>
-                <a:t>Share and re-use </a:t>
-              </a:r>
-              <a:r>
-                <a:rPr lang="en-GB" sz="1200" b="1" dirty="0" smtClean="0">
-                  <a:solidFill>
-                    <a:schemeClr val="bg2">
-                      <a:lumMod val="50000"/>
-                    </a:schemeClr>
-                  </a:solidFill>
-                </a:rPr>
-                <a:t>information</a:t>
-              </a:r>
-              <a:endParaRPr lang="en-GB" sz="1200" b="1" dirty="0">
-                <a:solidFill>
-                  <a:schemeClr val="bg2">
-                    <a:lumMod val="50000"/>
-                  </a:schemeClr>
-                </a:solidFill>
-              </a:endParaRPr>
-            </a:p>
-          </p:txBody>
-        </p:sp>
-      </p:grpSp>
+      <p:sp>
+        <p:nvSpPr>
+          <p:cNvPr id="2" name="Title 1"/>
+          <p:cNvSpPr>
+            <a:spLocks noGrp="1"/>
+          </p:cNvSpPr>
+          <p:nvPr>
+            <p:ph type="ctrTitle"/>
+          </p:nvPr>
+        </p:nvSpPr>
+        <p:spPr/>
+        <p:txBody>
+          <a:bodyPr/>
+          <a:lstStyle/>
+          <a:p>
+            <a:endParaRPr lang="en-GB"/>
+          </a:p>
+        </p:txBody>
+      </p:sp>
+      <p:sp>
+        <p:nvSpPr>
+          <p:cNvPr id="3" name="Subtitle 2"/>
+          <p:cNvSpPr>
+            <a:spLocks noGrp="1"/>
+          </p:cNvSpPr>
+          <p:nvPr>
+            <p:ph type="subTitle" idx="1"/>
+          </p:nvPr>
+        </p:nvSpPr>
+        <p:spPr/>
+        <p:txBody>
+          <a:bodyPr/>
+          <a:lstStyle/>
+          <a:p>
+            <a:endParaRPr lang="en-GB"/>
+          </a:p>
+        </p:txBody>
+      </p:sp>
     </p:spTree>
     <p:extLst>
       <p:ext uri="{BB962C8B-B14F-4D97-AF65-F5344CB8AC3E}">
-        <p14:creationId xmlns:p14="http://schemas.microsoft.com/office/powerpoint/2010/main" val="529661203"/>
+        <p14:creationId xmlns:p14="http://schemas.microsoft.com/office/powerpoint/2010/main" val="1552657528"/>
       </p:ext>
     </p:extLst>
   </p:cSld>
@@ -4128,39 +3026,39 @@
         <a:sysClr val="window" lastClr="FFFFFF"/>
       </a:lt1>
       <a:dk2>
-        <a:srgbClr val="1F497D"/>
+        <a:srgbClr val="44546A"/>
       </a:dk2>
       <a:lt2>
-        <a:srgbClr val="EEECE1"/>
+        <a:srgbClr val="E7E6E6"/>
       </a:lt2>
       <a:accent1>
-        <a:srgbClr val="4F81BD"/>
+        <a:srgbClr val="5B9BD5"/>
       </a:accent1>
       <a:accent2>
-        <a:srgbClr val="C0504D"/>
+        <a:srgbClr val="ED7D31"/>
       </a:accent2>
       <a:accent3>
-        <a:srgbClr val="9BBB59"/>
+        <a:srgbClr val="A5A5A5"/>
       </a:accent3>
       <a:accent4>
-        <a:srgbClr val="8064A2"/>
+        <a:srgbClr val="FFC000"/>
       </a:accent4>
       <a:accent5>
-        <a:srgbClr val="4BACC6"/>
+        <a:srgbClr val="4472C4"/>
       </a:accent5>
       <a:accent6>
-        <a:srgbClr val="F79646"/>
+        <a:srgbClr val="70AD47"/>
       </a:accent6>
       <a:hlink>
-        <a:srgbClr val="0000FF"/>
+        <a:srgbClr val="0563C1"/>
       </a:hlink>
       <a:folHlink>
-        <a:srgbClr val="800080"/>
+        <a:srgbClr val="954F72"/>
       </a:folHlink>
     </a:clrScheme>
     <a:fontScheme name="Office">
       <a:majorFont>
-        <a:latin typeface="Calibri"/>
+        <a:latin typeface="Calibri Light" panose="020F0302020204030204"/>
         <a:ea typeface=""/>
         <a:cs typeface=""/>
         <a:font script="Jpan" typeface="ＭＳ Ｐゴシック"/>
@@ -4192,9 +3090,10 @@
         <a:font script="Mong" typeface="Mongolian Baiti"/>
         <a:font script="Viet" typeface="Times New Roman"/>
         <a:font script="Uigh" typeface="Microsoft Uighur"/>
+        <a:font script="Geor" typeface="Sylfaen"/>
       </a:majorFont>
       <a:minorFont>
-        <a:latin typeface="Calibri"/>
+        <a:latin typeface="Calibri" panose="020F0502020204030204"/>
         <a:ea typeface=""/>
         <a:cs typeface=""/>
         <a:font script="Jpan" typeface="ＭＳ Ｐゴシック"/>
@@ -4226,6 +3125,7 @@
         <a:font script="Mong" typeface="Mongolian Baiti"/>
         <a:font script="Viet" typeface="Arial"/>
         <a:font script="Uigh" typeface="Microsoft Uighur"/>
+        <a:font script="Geor" typeface="Sylfaen"/>
       </a:minorFont>
     </a:fontScheme>
     <a:fmtScheme name="Office">
@@ -4237,165 +3137,141 @@
           <a:gsLst>
             <a:gs pos="0">
               <a:schemeClr val="phClr">
-                <a:tint val="50000"/>
-                <a:satMod val="300000"/>
+                <a:lumMod val="110000"/>
+                <a:satMod val="105000"/>
+                <a:tint val="67000"/>
               </a:schemeClr>
             </a:gs>
-            <a:gs pos="35000">
+            <a:gs pos="50000">
               <a:schemeClr val="phClr">
-                <a:tint val="37000"/>
-                <a:satMod val="300000"/>
+                <a:lumMod val="105000"/>
+                <a:satMod val="103000"/>
+                <a:tint val="73000"/>
               </a:schemeClr>
             </a:gs>
             <a:gs pos="100000">
               <a:schemeClr val="phClr">
-                <a:tint val="15000"/>
-                <a:satMod val="350000"/>
+                <a:lumMod val="105000"/>
+                <a:satMod val="109000"/>
+                <a:tint val="81000"/>
               </a:schemeClr>
             </a:gs>
           </a:gsLst>
-          <a:lin ang="16200000" scaled="1"/>
+          <a:lin ang="5400000" scaled="0"/>
         </a:gradFill>
         <a:gradFill rotWithShape="1">
           <a:gsLst>
             <a:gs pos="0">
               <a:schemeClr val="phClr">
-                <a:shade val="51000"/>
-                <a:satMod val="130000"/>
+                <a:satMod val="103000"/>
+                <a:lumMod val="102000"/>
+                <a:tint val="94000"/>
               </a:schemeClr>
             </a:gs>
-            <a:gs pos="80000">
+            <a:gs pos="50000">
               <a:schemeClr val="phClr">
-                <a:shade val="93000"/>
-                <a:satMod val="130000"/>
+                <a:satMod val="110000"/>
+                <a:lumMod val="100000"/>
+                <a:shade val="100000"/>
               </a:schemeClr>
             </a:gs>
             <a:gs pos="100000">
               <a:schemeClr val="phClr">
-                <a:shade val="94000"/>
-                <a:satMod val="135000"/>
+                <a:lumMod val="99000"/>
+                <a:satMod val="120000"/>
+                <a:shade val="78000"/>
               </a:schemeClr>
             </a:gs>
           </a:gsLst>
-          <a:lin ang="16200000" scaled="0"/>
+          <a:lin ang="5400000" scaled="0"/>
         </a:gradFill>
       </a:fillStyleLst>
       <a:lnStyleLst>
-        <a:ln w="9525" cap="flat" cmpd="sng" algn="ctr">
-          <a:solidFill>
-            <a:schemeClr val="phClr">
-              <a:shade val="95000"/>
-              <a:satMod val="105000"/>
-            </a:schemeClr>
-          </a:solidFill>
-          <a:prstDash val="solid"/>
-        </a:ln>
-        <a:ln w="25400" cap="flat" cmpd="sng" algn="ctr">
+        <a:ln w="6350" cap="flat" cmpd="sng" algn="ctr">
           <a:solidFill>
             <a:schemeClr val="phClr"/>
           </a:solidFill>
           <a:prstDash val="solid"/>
+          <a:miter lim="800000"/>
         </a:ln>
-        <a:ln w="38100" cap="flat" cmpd="sng" algn="ctr">
+        <a:ln w="12700" cap="flat" cmpd="sng" algn="ctr">
           <a:solidFill>
             <a:schemeClr val="phClr"/>
           </a:solidFill>
           <a:prstDash val="solid"/>
+          <a:miter lim="800000"/>
+        </a:ln>
+        <a:ln w="19050" cap="flat" cmpd="sng" algn="ctr">
+          <a:solidFill>
+            <a:schemeClr val="phClr"/>
+          </a:solidFill>
+          <a:prstDash val="solid"/>
+          <a:miter lim="800000"/>
         </a:ln>
       </a:lnStyleLst>
       <a:effectStyleLst>
         <a:effectStyle>
+          <a:effectLst/>
+        </a:effectStyle>
+        <a:effectStyle>
+          <a:effectLst/>
+        </a:effectStyle>
+        <a:effectStyle>
           <a:effectLst>
-            <a:outerShdw blurRad="40000" dist="20000" dir="5400000" rotWithShape="0">
+            <a:outerShdw blurRad="57150" dist="19050" dir="5400000" algn="ctr" rotWithShape="0">
               <a:srgbClr val="000000">
-                <a:alpha val="38000"/>
+                <a:alpha val="63000"/>
               </a:srgbClr>
             </a:outerShdw>
           </a:effectLst>
-        </a:effectStyle>
-        <a:effectStyle>
-          <a:effectLst>
-            <a:outerShdw blurRad="40000" dist="23000" dir="5400000" rotWithShape="0">
-              <a:srgbClr val="000000">
-                <a:alpha val="35000"/>
-              </a:srgbClr>
-            </a:outerShdw>
-          </a:effectLst>
-        </a:effectStyle>
-        <a:effectStyle>
-          <a:effectLst>
-            <a:outerShdw blurRad="40000" dist="23000" dir="5400000" rotWithShape="0">
-              <a:srgbClr val="000000">
-                <a:alpha val="35000"/>
-              </a:srgbClr>
-            </a:outerShdw>
-          </a:effectLst>
-          <a:scene3d>
-            <a:camera prst="orthographicFront">
-              <a:rot lat="0" lon="0" rev="0"/>
-            </a:camera>
-            <a:lightRig rig="threePt" dir="t">
-              <a:rot lat="0" lon="0" rev="1200000"/>
-            </a:lightRig>
-          </a:scene3d>
-          <a:sp3d>
-            <a:bevelT w="63500" h="25400"/>
-          </a:sp3d>
         </a:effectStyle>
       </a:effectStyleLst>
       <a:bgFillStyleLst>
         <a:solidFill>
           <a:schemeClr val="phClr"/>
         </a:solidFill>
+        <a:solidFill>
+          <a:schemeClr val="phClr">
+            <a:tint val="95000"/>
+            <a:satMod val="170000"/>
+          </a:schemeClr>
+        </a:solidFill>
         <a:gradFill rotWithShape="1">
           <a:gsLst>
             <a:gs pos="0">
               <a:schemeClr val="phClr">
-                <a:tint val="40000"/>
-                <a:satMod val="350000"/>
+                <a:tint val="93000"/>
+                <a:satMod val="150000"/>
+                <a:shade val="98000"/>
+                <a:lumMod val="102000"/>
               </a:schemeClr>
             </a:gs>
-            <a:gs pos="40000">
+            <a:gs pos="50000">
               <a:schemeClr val="phClr">
-                <a:tint val="45000"/>
-                <a:shade val="99000"/>
-                <a:satMod val="350000"/>
+                <a:tint val="98000"/>
+                <a:satMod val="130000"/>
+                <a:shade val="90000"/>
+                <a:lumMod val="103000"/>
               </a:schemeClr>
             </a:gs>
             <a:gs pos="100000">
               <a:schemeClr val="phClr">
-                <a:shade val="20000"/>
-                <a:satMod val="255000"/>
+                <a:shade val="63000"/>
+                <a:satMod val="120000"/>
               </a:schemeClr>
             </a:gs>
           </a:gsLst>
-          <a:path path="circle">
-            <a:fillToRect l="50000" t="-80000" r="50000" b="180000"/>
-          </a:path>
-        </a:gradFill>
-        <a:gradFill rotWithShape="1">
-          <a:gsLst>
-            <a:gs pos="0">
-              <a:schemeClr val="phClr">
-                <a:tint val="80000"/>
-                <a:satMod val="300000"/>
-              </a:schemeClr>
-            </a:gs>
-            <a:gs pos="100000">
-              <a:schemeClr val="phClr">
-                <a:shade val="30000"/>
-                <a:satMod val="200000"/>
-              </a:schemeClr>
-            </a:gs>
-          </a:gsLst>
-          <a:path path="circle">
-            <a:fillToRect l="50000" t="50000" r="50000" b="50000"/>
-          </a:path>
+          <a:lin ang="5400000" scaled="0"/>
         </a:gradFill>
       </a:bgFillStyleLst>
     </a:fmtScheme>
   </a:themeElements>
   <a:objectDefaults/>
   <a:extraClrSchemeLst/>
+  <a:extLst>
+    <a:ext uri="{05A4C25C-085E-4340-85A3-A5531E510DB2}">
+      <thm15:themeFamily xmlns:thm15="http://schemas.microsoft.com/office/thememl/2012/main" name="Office Theme" id="{62F939B6-93AF-4DB8-9C6B-D6C7DFDC589F}" vid="{4A3C46E8-61CC-4603-A589-7422A47A8E4A}"/>
+    </a:ext>
+  </a:extLst>
 </a:theme>
 </file>
</xml_diff>